<commit_message>
Refactor zodiac toggle functionality and update README with new label mode details
</commit_message>
<xml_diff>
--- a/archive/birth-sky.pptx
+++ b/archive/birth-sky.pptx
@@ -117,7 +117,7 @@
 <file path=ppt/revisionInfo.xml><?xml version="1.0" encoding="utf-8"?>
 <p1510:revInfo xmlns:a="http://schemas.openxmlformats.org/drawingml/2006/main" xmlns:r="http://schemas.openxmlformats.org/officeDocument/2006/relationships" xmlns:p1510="http://schemas.microsoft.com/office/powerpoint/2015/10/main">
   <p1510:revLst>
-    <p1510:client id="{2E93C782-0E14-416A-B059-B82164B74B38}" v="49" dt="2025-04-15T19:52:48.428"/>
+    <p1510:client id="{2E93C782-0E14-416A-B059-B82164B74B38}" v="51" dt="2025-04-16T14:53:39.863"/>
   </p1510:revLst>
 </p1510:revInfo>
 </file>
@@ -127,7 +127,7 @@
   <pc:docChgLst>
     <pc:chgData name="Ned Gulley" userId="3cc63692-f2ac-4e23-b89f-2e6558fa7b42" providerId="ADAL" clId="{2E93C782-0E14-416A-B059-B82164B74B38}"/>
     <pc:docChg chg="undo custSel addSld modSld">
-      <pc:chgData name="Ned Gulley" userId="3cc63692-f2ac-4e23-b89f-2e6558fa7b42" providerId="ADAL" clId="{2E93C782-0E14-416A-B059-B82164B74B38}" dt="2025-04-15T19:53:59.328" v="911"/>
+      <pc:chgData name="Ned Gulley" userId="3cc63692-f2ac-4e23-b89f-2e6558fa7b42" providerId="ADAL" clId="{2E93C782-0E14-416A-B059-B82164B74B38}" dt="2025-04-16T14:54:01.768" v="993" actId="1076"/>
       <pc:docMkLst>
         <pc:docMk/>
       </pc:docMkLst>
@@ -275,7 +275,7 @@
         </pc:cxnChg>
       </pc:sldChg>
       <pc:sldChg chg="addSp delSp modSp add mod setBg">
-        <pc:chgData name="Ned Gulley" userId="3cc63692-f2ac-4e23-b89f-2e6558fa7b42" providerId="ADAL" clId="{2E93C782-0E14-416A-B059-B82164B74B38}" dt="2025-04-07T18:54:49.767" v="876" actId="207"/>
+        <pc:chgData name="Ned Gulley" userId="3cc63692-f2ac-4e23-b89f-2e6558fa7b42" providerId="ADAL" clId="{2E93C782-0E14-416A-B059-B82164B74B38}" dt="2025-04-16T14:54:01.768" v="993" actId="1076"/>
         <pc:sldMkLst>
           <pc:docMk/>
           <pc:sldMk cId="1183880799" sldId="257"/>
@@ -302,6 +302,14 @@
             <pc:docMk/>
             <pc:sldMk cId="1183880799" sldId="257"/>
             <ac:spMk id="4" creationId="{F64436CF-BE1C-4519-30DE-A270D902C8C5}"/>
+          </ac:spMkLst>
+        </pc:spChg>
+        <pc:spChg chg="add mod">
+          <ac:chgData name="Ned Gulley" userId="3cc63692-f2ac-4e23-b89f-2e6558fa7b42" providerId="ADAL" clId="{2E93C782-0E14-416A-B059-B82164B74B38}" dt="2025-04-16T14:48:56.670" v="914" actId="207"/>
+          <ac:spMkLst>
+            <pc:docMk/>
+            <pc:sldMk cId="1183880799" sldId="257"/>
+            <ac:spMk id="5" creationId="{9ECC193C-D36C-95FC-F5C9-03CA890A430A}"/>
           </ac:spMkLst>
         </pc:spChg>
         <pc:spChg chg="mod">
@@ -353,7 +361,7 @@
           </ac:spMkLst>
         </pc:spChg>
         <pc:spChg chg="add mod">
-          <ac:chgData name="Ned Gulley" userId="3cc63692-f2ac-4e23-b89f-2e6558fa7b42" providerId="ADAL" clId="{2E93C782-0E14-416A-B059-B82164B74B38}" dt="2025-04-07T18:54:03.188" v="864" actId="1076"/>
+          <ac:chgData name="Ned Gulley" userId="3cc63692-f2ac-4e23-b89f-2e6558fa7b42" providerId="ADAL" clId="{2E93C782-0E14-416A-B059-B82164B74B38}" dt="2025-04-16T14:53:58.617" v="992" actId="1076"/>
           <ac:spMkLst>
             <pc:docMk/>
             <pc:sldMk cId="1183880799" sldId="257"/>
@@ -361,7 +369,7 @@
           </ac:spMkLst>
         </pc:spChg>
         <pc:spChg chg="add mod">
-          <ac:chgData name="Ned Gulley" userId="3cc63692-f2ac-4e23-b89f-2e6558fa7b42" providerId="ADAL" clId="{2E93C782-0E14-416A-B059-B82164B74B38}" dt="2025-04-07T18:54:06.481" v="865" actId="1076"/>
+          <ac:chgData name="Ned Gulley" userId="3cc63692-f2ac-4e23-b89f-2e6558fa7b42" providerId="ADAL" clId="{2E93C782-0E14-416A-B059-B82164B74B38}" dt="2025-04-16T14:54:01.768" v="993" actId="1076"/>
           <ac:spMkLst>
             <pc:docMk/>
             <pc:sldMk cId="1183880799" sldId="257"/>
@@ -465,7 +473,7 @@
           </ac:spMkLst>
         </pc:spChg>
         <pc:spChg chg="add mod ord">
-          <ac:chgData name="Ned Gulley" userId="3cc63692-f2ac-4e23-b89f-2e6558fa7b42" providerId="ADAL" clId="{2E93C782-0E14-416A-B059-B82164B74B38}" dt="2025-04-07T18:54:49.767" v="876" actId="207"/>
+          <ac:chgData name="Ned Gulley" userId="3cc63692-f2ac-4e23-b89f-2e6558fa7b42" providerId="ADAL" clId="{2E93C782-0E14-416A-B059-B82164B74B38}" dt="2025-04-16T14:48:29.045" v="912" actId="207"/>
           <ac:spMkLst>
             <pc:docMk/>
             <pc:sldMk cId="1183880799" sldId="257"/>
@@ -473,7 +481,7 @@
           </ac:spMkLst>
         </pc:spChg>
         <pc:spChg chg="add mod">
-          <ac:chgData name="Ned Gulley" userId="3cc63692-f2ac-4e23-b89f-2e6558fa7b42" providerId="ADAL" clId="{2E93C782-0E14-416A-B059-B82164B74B38}" dt="2025-04-07T18:39:00.881" v="244" actId="1076"/>
+          <ac:chgData name="Ned Gulley" userId="3cc63692-f2ac-4e23-b89f-2e6558fa7b42" providerId="ADAL" clId="{2E93C782-0E14-416A-B059-B82164B74B38}" dt="2025-04-16T14:49:34.909" v="916" actId="1076"/>
           <ac:spMkLst>
             <pc:docMk/>
             <pc:sldMk cId="1183880799" sldId="257"/>
@@ -536,12 +544,36 @@
             <ac:spMk id="53" creationId="{8C8CF3D7-1C5E-C549-001F-3D58FFC0F2A2}"/>
           </ac:spMkLst>
         </pc:spChg>
+        <pc:spChg chg="add del mod">
+          <ac:chgData name="Ned Gulley" userId="3cc63692-f2ac-4e23-b89f-2e6558fa7b42" providerId="ADAL" clId="{2E93C782-0E14-416A-B059-B82164B74B38}" dt="2025-04-16T14:50:21.987" v="918" actId="478"/>
+          <ac:spMkLst>
+            <pc:docMk/>
+            <pc:sldMk cId="1183880799" sldId="257"/>
+            <ac:spMk id="54" creationId="{EDC5FC2D-F22D-A18D-E363-C0CBBF105592}"/>
+          </ac:spMkLst>
+        </pc:spChg>
         <pc:spChg chg="add mod">
           <ac:chgData name="Ned Gulley" userId="3cc63692-f2ac-4e23-b89f-2e6558fa7b42" providerId="ADAL" clId="{2E93C782-0E14-416A-B059-B82164B74B38}" dt="2025-04-07T18:46:59.526" v="827" actId="1076"/>
           <ac:spMkLst>
             <pc:docMk/>
             <pc:sldMk cId="1183880799" sldId="257"/>
             <ac:spMk id="55" creationId="{70498D5A-5563-4B2E-4044-421063260B0C}"/>
+          </ac:spMkLst>
+        </pc:spChg>
+        <pc:spChg chg="add mod">
+          <ac:chgData name="Ned Gulley" userId="3cc63692-f2ac-4e23-b89f-2e6558fa7b42" providerId="ADAL" clId="{2E93C782-0E14-416A-B059-B82164B74B38}" dt="2025-04-16T14:53:36.768" v="952" actId="688"/>
+          <ac:spMkLst>
+            <pc:docMk/>
+            <pc:sldMk cId="1183880799" sldId="257"/>
+            <ac:spMk id="56" creationId="{42D5FF96-D266-E286-BAA7-6441BA54A1E4}"/>
+          </ac:spMkLst>
+        </pc:spChg>
+        <pc:spChg chg="add mod">
+          <ac:chgData name="Ned Gulley" userId="3cc63692-f2ac-4e23-b89f-2e6558fa7b42" providerId="ADAL" clId="{2E93C782-0E14-416A-B059-B82164B74B38}" dt="2025-04-16T14:53:52.846" v="991" actId="688"/>
+          <ac:spMkLst>
+            <pc:docMk/>
+            <pc:sldMk cId="1183880799" sldId="257"/>
+            <ac:spMk id="57" creationId="{05A62FA0-6CBA-2973-3FCD-46D58BAC41FF}"/>
           </ac:spMkLst>
         </pc:spChg>
         <pc:cxnChg chg="mod">
@@ -1000,7 +1032,7 @@
           <a:p>
             <a:fld id="{EE606AEF-1D4D-4006-A373-63B33284AF0C}" type="datetimeFigureOut">
               <a:rPr lang="en-US" smtClean="0"/>
-              <a:t>4/15/2025</a:t>
+              <a:t>4/16/2025</a:t>
             </a:fld>
             <a:endParaRPr lang="en-US"/>
           </a:p>
@@ -1198,7 +1230,7 @@
           <a:p>
             <a:fld id="{EE606AEF-1D4D-4006-A373-63B33284AF0C}" type="datetimeFigureOut">
               <a:rPr lang="en-US" smtClean="0"/>
-              <a:t>4/15/2025</a:t>
+              <a:t>4/16/2025</a:t>
             </a:fld>
             <a:endParaRPr lang="en-US"/>
           </a:p>
@@ -1406,7 +1438,7 @@
           <a:p>
             <a:fld id="{EE606AEF-1D4D-4006-A373-63B33284AF0C}" type="datetimeFigureOut">
               <a:rPr lang="en-US" smtClean="0"/>
-              <a:t>4/15/2025</a:t>
+              <a:t>4/16/2025</a:t>
             </a:fld>
             <a:endParaRPr lang="en-US"/>
           </a:p>
@@ -1604,7 +1636,7 @@
           <a:p>
             <a:fld id="{EE606AEF-1D4D-4006-A373-63B33284AF0C}" type="datetimeFigureOut">
               <a:rPr lang="en-US" smtClean="0"/>
-              <a:t>4/15/2025</a:t>
+              <a:t>4/16/2025</a:t>
             </a:fld>
             <a:endParaRPr lang="en-US"/>
           </a:p>
@@ -1879,7 +1911,7 @@
           <a:p>
             <a:fld id="{EE606AEF-1D4D-4006-A373-63B33284AF0C}" type="datetimeFigureOut">
               <a:rPr lang="en-US" smtClean="0"/>
-              <a:t>4/15/2025</a:t>
+              <a:t>4/16/2025</a:t>
             </a:fld>
             <a:endParaRPr lang="en-US"/>
           </a:p>
@@ -2144,7 +2176,7 @@
           <a:p>
             <a:fld id="{EE606AEF-1D4D-4006-A373-63B33284AF0C}" type="datetimeFigureOut">
               <a:rPr lang="en-US" smtClean="0"/>
-              <a:t>4/15/2025</a:t>
+              <a:t>4/16/2025</a:t>
             </a:fld>
             <a:endParaRPr lang="en-US"/>
           </a:p>
@@ -2556,7 +2588,7 @@
           <a:p>
             <a:fld id="{EE606AEF-1D4D-4006-A373-63B33284AF0C}" type="datetimeFigureOut">
               <a:rPr lang="en-US" smtClean="0"/>
-              <a:t>4/15/2025</a:t>
+              <a:t>4/16/2025</a:t>
             </a:fld>
             <a:endParaRPr lang="en-US"/>
           </a:p>
@@ -2697,7 +2729,7 @@
           <a:p>
             <a:fld id="{EE606AEF-1D4D-4006-A373-63B33284AF0C}" type="datetimeFigureOut">
               <a:rPr lang="en-US" smtClean="0"/>
-              <a:t>4/15/2025</a:t>
+              <a:t>4/16/2025</a:t>
             </a:fld>
             <a:endParaRPr lang="en-US"/>
           </a:p>
@@ -2810,7 +2842,7 @@
           <a:p>
             <a:fld id="{EE606AEF-1D4D-4006-A373-63B33284AF0C}" type="datetimeFigureOut">
               <a:rPr lang="en-US" smtClean="0"/>
-              <a:t>4/15/2025</a:t>
+              <a:t>4/16/2025</a:t>
             </a:fld>
             <a:endParaRPr lang="en-US"/>
           </a:p>
@@ -3121,7 +3153,7 @@
           <a:p>
             <a:fld id="{EE606AEF-1D4D-4006-A373-63B33284AF0C}" type="datetimeFigureOut">
               <a:rPr lang="en-US" smtClean="0"/>
-              <a:t>4/15/2025</a:t>
+              <a:t>4/16/2025</a:t>
             </a:fld>
             <a:endParaRPr lang="en-US"/>
           </a:p>
@@ -3409,7 +3441,7 @@
           <a:p>
             <a:fld id="{EE606AEF-1D4D-4006-A373-63B33284AF0C}" type="datetimeFigureOut">
               <a:rPr lang="en-US" smtClean="0"/>
-              <a:t>4/15/2025</a:t>
+              <a:t>4/16/2025</a:t>
             </a:fld>
             <a:endParaRPr lang="en-US"/>
           </a:p>
@@ -3650,7 +3682,7 @@
           <a:p>
             <a:fld id="{EE606AEF-1D4D-4006-A373-63B33284AF0C}" type="datetimeFigureOut">
               <a:rPr lang="en-US" smtClean="0"/>
-              <a:t>4/15/2025</a:t>
+              <a:t>4/16/2025</a:t>
             </a:fld>
             <a:endParaRPr lang="en-US"/>
           </a:p>
@@ -5545,20 +5577,7 @@
           <a:prstGeom prst="rect">
             <a:avLst/>
           </a:prstGeom>
-          <a:gradFill>
-            <a:gsLst>
-              <a:gs pos="30000">
-                <a:schemeClr val="bg1"/>
-              </a:gs>
-              <a:gs pos="74000">
-                <a:schemeClr val="tx2">
-                  <a:lumMod val="50000"/>
-                  <a:lumOff val="50000"/>
-                </a:schemeClr>
-              </a:gs>
-            </a:gsLst>
-            <a:lin ang="16200000" scaled="0"/>
-          </a:gradFill>
+          <a:noFill/>
           <a:ln>
             <a:solidFill>
               <a:schemeClr val="accent1">
@@ -7287,7 +7306,7 @@
         </p:nvSpPr>
         <p:spPr>
           <a:xfrm>
-            <a:off x="5924384" y="4977547"/>
+            <a:off x="3436240" y="5512252"/>
             <a:ext cx="1329470" cy="430887"/>
           </a:xfrm>
           <a:prstGeom prst="rect">
@@ -7328,7 +7347,7 @@
         </p:nvSpPr>
         <p:spPr>
           <a:xfrm>
-            <a:off x="3814212" y="5030415"/>
+            <a:off x="6615795" y="5445720"/>
             <a:ext cx="1329470" cy="430887"/>
           </a:xfrm>
           <a:prstGeom prst="rect">
@@ -7902,6 +7921,161 @@
               <a:rPr lang="en-US" sz="1100" dirty="0"/>
               <a:t>16 Dec 1964</a:t>
             </a:r>
+          </a:p>
+        </p:txBody>
+      </p:sp>
+      <p:sp>
+        <p:nvSpPr>
+          <p:cNvPr id="5" name="Oval 4">
+            <a:extLst>
+              <a:ext uri="{FF2B5EF4-FFF2-40B4-BE49-F238E27FC236}">
+                <a16:creationId xmlns:a16="http://schemas.microsoft.com/office/drawing/2014/main" id="{9ECC193C-D36C-95FC-F5C9-03CA890A430A}"/>
+              </a:ext>
+            </a:extLst>
+          </p:cNvPr>
+          <p:cNvSpPr/>
+          <p:nvPr/>
+        </p:nvSpPr>
+        <p:spPr>
+          <a:xfrm>
+            <a:off x="3179748" y="1072127"/>
+            <a:ext cx="4987124" cy="4987124"/>
+          </a:xfrm>
+          <a:prstGeom prst="ellipse">
+            <a:avLst/>
+          </a:prstGeom>
+          <a:noFill/>
+        </p:spPr>
+        <p:style>
+          <a:lnRef idx="2">
+            <a:schemeClr val="accent1">
+              <a:shade val="15000"/>
+            </a:schemeClr>
+          </a:lnRef>
+          <a:fillRef idx="1">
+            <a:schemeClr val="accent1"/>
+          </a:fillRef>
+          <a:effectRef idx="0">
+            <a:schemeClr val="accent1"/>
+          </a:effectRef>
+          <a:fontRef idx="minor">
+            <a:schemeClr val="lt1"/>
+          </a:fontRef>
+        </p:style>
+        <p:txBody>
+          <a:bodyPr rtlCol="0" anchor="ctr"/>
+          <a:lstStyle/>
+          <a:p>
+            <a:pPr algn="ctr"/>
+            <a:endParaRPr lang="en-US"/>
+          </a:p>
+        </p:txBody>
+      </p:sp>
+      <p:sp>
+        <p:nvSpPr>
+          <p:cNvPr id="56" name="Arc 55">
+            <a:extLst>
+              <a:ext uri="{FF2B5EF4-FFF2-40B4-BE49-F238E27FC236}">
+                <a16:creationId xmlns:a16="http://schemas.microsoft.com/office/drawing/2014/main" id="{42D5FF96-D266-E286-BAA7-6441BA54A1E4}"/>
+              </a:ext>
+            </a:extLst>
+          </p:cNvPr>
+          <p:cNvSpPr/>
+          <p:nvPr/>
+        </p:nvSpPr>
+        <p:spPr>
+          <a:xfrm rot="4391090">
+            <a:off x="3221585" y="1043364"/>
+            <a:ext cx="4905247" cy="4986435"/>
+          </a:xfrm>
+          <a:prstGeom prst="arc">
+            <a:avLst>
+              <a:gd name="adj1" fmla="val 18120327"/>
+              <a:gd name="adj2" fmla="val 21585423"/>
+            </a:avLst>
+          </a:prstGeom>
+          <a:ln w="254000">
+            <a:solidFill>
+              <a:schemeClr val="accent1">
+                <a:alpha val="43000"/>
+              </a:schemeClr>
+            </a:solidFill>
+          </a:ln>
+        </p:spPr>
+        <p:style>
+          <a:lnRef idx="2">
+            <a:schemeClr val="accent1"/>
+          </a:lnRef>
+          <a:fillRef idx="0">
+            <a:schemeClr val="accent1"/>
+          </a:fillRef>
+          <a:effectRef idx="1">
+            <a:schemeClr val="accent1"/>
+          </a:effectRef>
+          <a:fontRef idx="minor">
+            <a:schemeClr val="tx1"/>
+          </a:fontRef>
+        </p:style>
+        <p:txBody>
+          <a:bodyPr rtlCol="0" anchor="ctr"/>
+          <a:lstStyle/>
+          <a:p>
+            <a:pPr algn="ctr"/>
+            <a:endParaRPr lang="en-US"/>
+          </a:p>
+        </p:txBody>
+      </p:sp>
+      <p:sp>
+        <p:nvSpPr>
+          <p:cNvPr id="57" name="Arc 56">
+            <a:extLst>
+              <a:ext uri="{FF2B5EF4-FFF2-40B4-BE49-F238E27FC236}">
+                <a16:creationId xmlns:a16="http://schemas.microsoft.com/office/drawing/2014/main" id="{05A62FA0-6CBA-2973-3FCD-46D58BAC41FF}"/>
+              </a:ext>
+            </a:extLst>
+          </p:cNvPr>
+          <p:cNvSpPr/>
+          <p:nvPr/>
+        </p:nvSpPr>
+        <p:spPr>
+          <a:xfrm rot="10261442">
+            <a:off x="3228329" y="1033924"/>
+            <a:ext cx="4905247" cy="4986435"/>
+          </a:xfrm>
+          <a:prstGeom prst="arc">
+            <a:avLst>
+              <a:gd name="adj1" fmla="val 18120327"/>
+              <a:gd name="adj2" fmla="val 21585423"/>
+            </a:avLst>
+          </a:prstGeom>
+          <a:ln w="254000">
+            <a:solidFill>
+              <a:schemeClr val="accent1">
+                <a:alpha val="43000"/>
+              </a:schemeClr>
+            </a:solidFill>
+          </a:ln>
+        </p:spPr>
+        <p:style>
+          <a:lnRef idx="2">
+            <a:schemeClr val="accent1"/>
+          </a:lnRef>
+          <a:fillRef idx="0">
+            <a:schemeClr val="accent1"/>
+          </a:fillRef>
+          <a:effectRef idx="1">
+            <a:schemeClr val="accent1"/>
+          </a:effectRef>
+          <a:fontRef idx="minor">
+            <a:schemeClr val="tx1"/>
+          </a:fontRef>
+        </p:style>
+        <p:txBody>
+          <a:bodyPr rtlCol="0" anchor="ctr"/>
+          <a:lstStyle/>
+          <a:p>
+            <a:pPr algn="ctr"/>
+            <a:endParaRPr lang="en-US"/>
           </a:p>
         </p:txBody>
       </p:sp>

</xml_diff>

<commit_message>
Add birth-sky presentation and design sketch to archive folder
</commit_message>
<xml_diff>
--- a/archive/birth-sky.pptx
+++ b/archive/birth-sky.pptx
@@ -7,7 +7,8 @@
   <p:sldIdLst>
     <p:sldId id="256" r:id="rId2"/>
     <p:sldId id="257" r:id="rId3"/>
-    <p:sldId id="258" r:id="rId4"/>
+    <p:sldId id="259" r:id="rId4"/>
+    <p:sldId id="258" r:id="rId5"/>
   </p:sldIdLst>
   <p:sldSz cx="12192000" cy="6858000"/>
   <p:notesSz cx="6858000" cy="9144000"/>
@@ -117,7 +118,7 @@
 <file path=ppt/revisionInfo.xml><?xml version="1.0" encoding="utf-8"?>
 <p1510:revInfo xmlns:a="http://schemas.openxmlformats.org/drawingml/2006/main" xmlns:r="http://schemas.openxmlformats.org/officeDocument/2006/relationships" xmlns:p1510="http://schemas.microsoft.com/office/powerpoint/2015/10/main">
   <p1510:revLst>
-    <p1510:client id="{2E93C782-0E14-416A-B059-B82164B74B38}" v="51" dt="2025-04-16T14:53:39.863"/>
+    <p1510:client id="{2E93C782-0E14-416A-B059-B82164B74B38}" v="56" dt="2025-04-21T20:12:32.684"/>
   </p1510:revLst>
 </p1510:revInfo>
 </file>
@@ -127,7 +128,7 @@
   <pc:docChgLst>
     <pc:chgData name="Ned Gulley" userId="3cc63692-f2ac-4e23-b89f-2e6558fa7b42" providerId="ADAL" clId="{2E93C782-0E14-416A-B059-B82164B74B38}"/>
     <pc:docChg chg="undo custSel addSld modSld">
-      <pc:chgData name="Ned Gulley" userId="3cc63692-f2ac-4e23-b89f-2e6558fa7b42" providerId="ADAL" clId="{2E93C782-0E14-416A-B059-B82164B74B38}" dt="2025-04-16T14:54:01.768" v="993" actId="1076"/>
+      <pc:chgData name="Ned Gulley" userId="3cc63692-f2ac-4e23-b89f-2e6558fa7b42" providerId="ADAL" clId="{2E93C782-0E14-416A-B059-B82164B74B38}" dt="2025-04-21T20:13:27.197" v="1065" actId="478"/>
       <pc:docMkLst>
         <pc:docMk/>
       </pc:docMkLst>
@@ -544,14 +545,6 @@
             <ac:spMk id="53" creationId="{8C8CF3D7-1C5E-C549-001F-3D58FFC0F2A2}"/>
           </ac:spMkLst>
         </pc:spChg>
-        <pc:spChg chg="add del mod">
-          <ac:chgData name="Ned Gulley" userId="3cc63692-f2ac-4e23-b89f-2e6558fa7b42" providerId="ADAL" clId="{2E93C782-0E14-416A-B059-B82164B74B38}" dt="2025-04-16T14:50:21.987" v="918" actId="478"/>
-          <ac:spMkLst>
-            <pc:docMk/>
-            <pc:sldMk cId="1183880799" sldId="257"/>
-            <ac:spMk id="54" creationId="{EDC5FC2D-F22D-A18D-E363-C0CBBF105592}"/>
-          </ac:spMkLst>
-        </pc:spChg>
         <pc:spChg chg="add mod">
           <ac:chgData name="Ned Gulley" userId="3cc63692-f2ac-4e23-b89f-2e6558fa7b42" providerId="ADAL" clId="{2E93C782-0E14-416A-B059-B82164B74B38}" dt="2025-04-07T18:46:59.526" v="827" actId="1076"/>
           <ac:spMkLst>
@@ -599,196 +592,12 @@
           <pc:docMk/>
           <pc:sldMk cId="2371161536" sldId="258"/>
         </pc:sldMkLst>
-        <pc:spChg chg="del">
-          <ac:chgData name="Ned Gulley" userId="3cc63692-f2ac-4e23-b89f-2e6558fa7b42" providerId="ADAL" clId="{2E93C782-0E14-416A-B059-B82164B74B38}" dt="2025-04-15T19:50:25.469" v="880" actId="478"/>
-          <ac:spMkLst>
-            <pc:docMk/>
-            <pc:sldMk cId="2371161536" sldId="258"/>
-            <ac:spMk id="2" creationId="{E5E35CCC-AA34-8882-D9A9-499851FD3B01}"/>
-          </ac:spMkLst>
-        </pc:spChg>
-        <pc:spChg chg="del">
-          <ac:chgData name="Ned Gulley" userId="3cc63692-f2ac-4e23-b89f-2e6558fa7b42" providerId="ADAL" clId="{2E93C782-0E14-416A-B059-B82164B74B38}" dt="2025-04-15T19:50:21.006" v="879" actId="478"/>
-          <ac:spMkLst>
-            <pc:docMk/>
-            <pc:sldMk cId="2371161536" sldId="258"/>
-            <ac:spMk id="3" creationId="{C75223EB-24E9-21B6-009C-9FF0EEEFB4F8}"/>
-          </ac:spMkLst>
-        </pc:spChg>
-        <pc:spChg chg="del">
-          <ac:chgData name="Ned Gulley" userId="3cc63692-f2ac-4e23-b89f-2e6558fa7b42" providerId="ADAL" clId="{2E93C782-0E14-416A-B059-B82164B74B38}" dt="2025-04-15T19:50:21.006" v="879" actId="478"/>
-          <ac:spMkLst>
-            <pc:docMk/>
-            <pc:sldMk cId="2371161536" sldId="258"/>
-            <ac:spMk id="4" creationId="{A8C2A096-47F8-685A-6EED-4F86DC60DAFC}"/>
-          </ac:spMkLst>
-        </pc:spChg>
-        <pc:spChg chg="del">
-          <ac:chgData name="Ned Gulley" userId="3cc63692-f2ac-4e23-b89f-2e6558fa7b42" providerId="ADAL" clId="{2E93C782-0E14-416A-B059-B82164B74B38}" dt="2025-04-15T19:50:48.116" v="891" actId="478"/>
-          <ac:spMkLst>
-            <pc:docMk/>
-            <pc:sldMk cId="2371161536" sldId="258"/>
-            <ac:spMk id="7" creationId="{51D9561D-77AF-552C-B318-D66F3FCE9529}"/>
-          </ac:spMkLst>
-        </pc:spChg>
-        <pc:spChg chg="del">
-          <ac:chgData name="Ned Gulley" userId="3cc63692-f2ac-4e23-b89f-2e6558fa7b42" providerId="ADAL" clId="{2E93C782-0E14-416A-B059-B82164B74B38}" dt="2025-04-15T19:50:36.636" v="885" actId="478"/>
-          <ac:spMkLst>
-            <pc:docMk/>
-            <pc:sldMk cId="2371161536" sldId="258"/>
-            <ac:spMk id="9" creationId="{41C32AAD-AB76-5916-1A9C-6150ED4E19BB}"/>
-          </ac:spMkLst>
-        </pc:spChg>
-        <pc:spChg chg="del">
-          <ac:chgData name="Ned Gulley" userId="3cc63692-f2ac-4e23-b89f-2e6558fa7b42" providerId="ADAL" clId="{2E93C782-0E14-416A-B059-B82164B74B38}" dt="2025-04-15T19:50:25.469" v="880" actId="478"/>
-          <ac:spMkLst>
-            <pc:docMk/>
-            <pc:sldMk cId="2371161536" sldId="258"/>
-            <ac:spMk id="12" creationId="{18D51B7A-A44B-2DCF-7AEC-9FA6C07696A8}"/>
-          </ac:spMkLst>
-        </pc:spChg>
-        <pc:spChg chg="del">
-          <ac:chgData name="Ned Gulley" userId="3cc63692-f2ac-4e23-b89f-2e6558fa7b42" providerId="ADAL" clId="{2E93C782-0E14-416A-B059-B82164B74B38}" dt="2025-04-15T19:50:21.006" v="879" actId="478"/>
-          <ac:spMkLst>
-            <pc:docMk/>
-            <pc:sldMk cId="2371161536" sldId="258"/>
-            <ac:spMk id="14" creationId="{EF08411A-F0E7-A927-280E-4C6780680AF6}"/>
-          </ac:spMkLst>
-        </pc:spChg>
-        <pc:spChg chg="del">
-          <ac:chgData name="Ned Gulley" userId="3cc63692-f2ac-4e23-b89f-2e6558fa7b42" providerId="ADAL" clId="{2E93C782-0E14-416A-B059-B82164B74B38}" dt="2025-04-15T19:50:38.973" v="886" actId="478"/>
-          <ac:spMkLst>
-            <pc:docMk/>
-            <pc:sldMk cId="2371161536" sldId="258"/>
-            <ac:spMk id="16" creationId="{1D50F4E7-DF47-2964-4810-318619461C32}"/>
-          </ac:spMkLst>
-        </pc:spChg>
-        <pc:spChg chg="del mod">
-          <ac:chgData name="Ned Gulley" userId="3cc63692-f2ac-4e23-b89f-2e6558fa7b42" providerId="ADAL" clId="{2E93C782-0E14-416A-B059-B82164B74B38}" dt="2025-04-15T19:50:42.452" v="888" actId="478"/>
-          <ac:spMkLst>
-            <pc:docMk/>
-            <pc:sldMk cId="2371161536" sldId="258"/>
-            <ac:spMk id="18" creationId="{DE300831-6FDB-F88C-FCB4-2D45F447883B}"/>
-          </ac:spMkLst>
-        </pc:spChg>
-        <pc:spChg chg="del">
-          <ac:chgData name="Ned Gulley" userId="3cc63692-f2ac-4e23-b89f-2e6558fa7b42" providerId="ADAL" clId="{2E93C782-0E14-416A-B059-B82164B74B38}" dt="2025-04-15T19:50:46.885" v="890" actId="478"/>
-          <ac:spMkLst>
-            <pc:docMk/>
-            <pc:sldMk cId="2371161536" sldId="258"/>
-            <ac:spMk id="21" creationId="{AF626BC1-968A-DDD1-6153-1D7507F42B3C}"/>
-          </ac:spMkLst>
-        </pc:spChg>
-        <pc:spChg chg="del">
-          <ac:chgData name="Ned Gulley" userId="3cc63692-f2ac-4e23-b89f-2e6558fa7b42" providerId="ADAL" clId="{2E93C782-0E14-416A-B059-B82164B74B38}" dt="2025-04-15T19:50:25.469" v="880" actId="478"/>
-          <ac:spMkLst>
-            <pc:docMk/>
-            <pc:sldMk cId="2371161536" sldId="258"/>
-            <ac:spMk id="22" creationId="{C141469C-2638-4CC3-7014-FEE0C850933E}"/>
-          </ac:spMkLst>
-        </pc:spChg>
-        <pc:spChg chg="del">
-          <ac:chgData name="Ned Gulley" userId="3cc63692-f2ac-4e23-b89f-2e6558fa7b42" providerId="ADAL" clId="{2E93C782-0E14-416A-B059-B82164B74B38}" dt="2025-04-15T19:50:36.636" v="885" actId="478"/>
-          <ac:spMkLst>
-            <pc:docMk/>
-            <pc:sldMk cId="2371161536" sldId="258"/>
-            <ac:spMk id="32" creationId="{351CF2EB-08C4-3472-0A7B-A3D4992DDD95}"/>
-          </ac:spMkLst>
-        </pc:spChg>
-        <pc:spChg chg="del mod">
-          <ac:chgData name="Ned Gulley" userId="3cc63692-f2ac-4e23-b89f-2e6558fa7b42" providerId="ADAL" clId="{2E93C782-0E14-416A-B059-B82164B74B38}" dt="2025-04-15T19:50:30.116" v="883" actId="478"/>
-          <ac:spMkLst>
-            <pc:docMk/>
-            <pc:sldMk cId="2371161536" sldId="258"/>
-            <ac:spMk id="44" creationId="{9AF8CC78-982F-BF33-D929-2C3C98BE119F}"/>
-          </ac:spMkLst>
-        </pc:spChg>
-        <pc:spChg chg="del mod">
-          <ac:chgData name="Ned Gulley" userId="3cc63692-f2ac-4e23-b89f-2e6558fa7b42" providerId="ADAL" clId="{2E93C782-0E14-416A-B059-B82164B74B38}" dt="2025-04-15T19:50:21.006" v="879" actId="478"/>
-          <ac:spMkLst>
-            <pc:docMk/>
-            <pc:sldMk cId="2371161536" sldId="258"/>
-            <ac:spMk id="45" creationId="{FC6EE579-6A63-1152-7541-7A29939F00F2}"/>
-          </ac:spMkLst>
-        </pc:spChg>
-        <pc:spChg chg="del">
-          <ac:chgData name="Ned Gulley" userId="3cc63692-f2ac-4e23-b89f-2e6558fa7b42" providerId="ADAL" clId="{2E93C782-0E14-416A-B059-B82164B74B38}" dt="2025-04-15T19:50:27.362" v="881" actId="478"/>
-          <ac:spMkLst>
-            <pc:docMk/>
-            <pc:sldMk cId="2371161536" sldId="258"/>
-            <ac:spMk id="46" creationId="{A420D15E-72F6-0083-6896-70B1962C8A53}"/>
-          </ac:spMkLst>
-        </pc:spChg>
-        <pc:spChg chg="del">
-          <ac:chgData name="Ned Gulley" userId="3cc63692-f2ac-4e23-b89f-2e6558fa7b42" providerId="ADAL" clId="{2E93C782-0E14-416A-B059-B82164B74B38}" dt="2025-04-15T19:50:32.396" v="884" actId="478"/>
-          <ac:spMkLst>
-            <pc:docMk/>
-            <pc:sldMk cId="2371161536" sldId="258"/>
-            <ac:spMk id="47" creationId="{197B59E3-9776-FED3-A23E-80F0EAC50C9B}"/>
-          </ac:spMkLst>
-        </pc:spChg>
-        <pc:spChg chg="del">
-          <ac:chgData name="Ned Gulley" userId="3cc63692-f2ac-4e23-b89f-2e6558fa7b42" providerId="ADAL" clId="{2E93C782-0E14-416A-B059-B82164B74B38}" dt="2025-04-15T19:50:32.396" v="884" actId="478"/>
-          <ac:spMkLst>
-            <pc:docMk/>
-            <pc:sldMk cId="2371161536" sldId="258"/>
-            <ac:spMk id="48" creationId="{A98673E3-8C18-760F-C2B7-2D5AED2C35E0}"/>
-          </ac:spMkLst>
-        </pc:spChg>
-        <pc:spChg chg="del">
-          <ac:chgData name="Ned Gulley" userId="3cc63692-f2ac-4e23-b89f-2e6558fa7b42" providerId="ADAL" clId="{2E93C782-0E14-416A-B059-B82164B74B38}" dt="2025-04-15T19:50:36.636" v="885" actId="478"/>
-          <ac:spMkLst>
-            <pc:docMk/>
-            <pc:sldMk cId="2371161536" sldId="258"/>
-            <ac:spMk id="49" creationId="{71A3CDAF-C4C6-2F26-08E9-BC6928D4FF4C}"/>
-          </ac:spMkLst>
-        </pc:spChg>
-        <pc:spChg chg="del">
-          <ac:chgData name="Ned Gulley" userId="3cc63692-f2ac-4e23-b89f-2e6558fa7b42" providerId="ADAL" clId="{2E93C782-0E14-416A-B059-B82164B74B38}" dt="2025-04-15T19:50:36.636" v="885" actId="478"/>
-          <ac:spMkLst>
-            <pc:docMk/>
-            <pc:sldMk cId="2371161536" sldId="258"/>
-            <ac:spMk id="50" creationId="{777FFC24-02D5-CE56-4BB0-DD6478217D64}"/>
-          </ac:spMkLst>
-        </pc:spChg>
-        <pc:spChg chg="del">
-          <ac:chgData name="Ned Gulley" userId="3cc63692-f2ac-4e23-b89f-2e6558fa7b42" providerId="ADAL" clId="{2E93C782-0E14-416A-B059-B82164B74B38}" dt="2025-04-15T19:50:45.813" v="889" actId="478"/>
-          <ac:spMkLst>
-            <pc:docMk/>
-            <pc:sldMk cId="2371161536" sldId="258"/>
-            <ac:spMk id="51" creationId="{6F70B93D-B5C7-E187-D29E-7220F1D90D59}"/>
-          </ac:spMkLst>
-        </pc:spChg>
-        <pc:spChg chg="del">
-          <ac:chgData name="Ned Gulley" userId="3cc63692-f2ac-4e23-b89f-2e6558fa7b42" providerId="ADAL" clId="{2E93C782-0E14-416A-B059-B82164B74B38}" dt="2025-04-15T19:50:25.469" v="880" actId="478"/>
-          <ac:spMkLst>
-            <pc:docMk/>
-            <pc:sldMk cId="2371161536" sldId="258"/>
-            <ac:spMk id="52" creationId="{AFD1C8E0-127B-18DB-9B33-61AEBA4A98E2}"/>
-          </ac:spMkLst>
-        </pc:spChg>
-        <pc:spChg chg="del">
-          <ac:chgData name="Ned Gulley" userId="3cc63692-f2ac-4e23-b89f-2e6558fa7b42" providerId="ADAL" clId="{2E93C782-0E14-416A-B059-B82164B74B38}" dt="2025-04-15T19:50:25.469" v="880" actId="478"/>
-          <ac:spMkLst>
-            <pc:docMk/>
-            <pc:sldMk cId="2371161536" sldId="258"/>
-            <ac:spMk id="53" creationId="{D6302E32-AB64-3F46-10D1-E8234708B0B7}"/>
-          </ac:spMkLst>
-        </pc:spChg>
         <pc:spChg chg="add mod">
           <ac:chgData name="Ned Gulley" userId="3cc63692-f2ac-4e23-b89f-2e6558fa7b42" providerId="ADAL" clId="{2E93C782-0E14-416A-B059-B82164B74B38}" dt="2025-04-15T19:52:02.938" v="896" actId="1076"/>
           <ac:spMkLst>
             <pc:docMk/>
             <pc:sldMk cId="2371161536" sldId="258"/>
             <ac:spMk id="54" creationId="{3E54B227-5093-E486-AE57-90526636EB1C}"/>
-          </ac:spMkLst>
-        </pc:spChg>
-        <pc:spChg chg="del">
-          <ac:chgData name="Ned Gulley" userId="3cc63692-f2ac-4e23-b89f-2e6558fa7b42" providerId="ADAL" clId="{2E93C782-0E14-416A-B059-B82164B74B38}" dt="2025-04-15T19:50:27.362" v="881" actId="478"/>
-          <ac:spMkLst>
-            <pc:docMk/>
-            <pc:sldMk cId="2371161536" sldId="258"/>
-            <ac:spMk id="55" creationId="{B8EDCAA7-D3C5-575D-5FAE-4ABE60FE6EA9}"/>
           </ac:spMkLst>
         </pc:spChg>
         <pc:spChg chg="add mod">
@@ -880,6 +689,165 @@
           </ac:spMkLst>
         </pc:spChg>
       </pc:sldChg>
+      <pc:sldChg chg="addSp delSp modSp add mod">
+        <pc:chgData name="Ned Gulley" userId="3cc63692-f2ac-4e23-b89f-2e6558fa7b42" providerId="ADAL" clId="{2E93C782-0E14-416A-B059-B82164B74B38}" dt="2025-04-21T20:13:27.197" v="1065" actId="478"/>
+        <pc:sldMkLst>
+          <pc:docMk/>
+          <pc:sldMk cId="890624571" sldId="259"/>
+        </pc:sldMkLst>
+        <pc:spChg chg="mod">
+          <ac:chgData name="Ned Gulley" userId="3cc63692-f2ac-4e23-b89f-2e6558fa7b42" providerId="ADAL" clId="{2E93C782-0E14-416A-B059-B82164B74B38}" dt="2025-04-21T20:09:51.757" v="1027" actId="1076"/>
+          <ac:spMkLst>
+            <pc:docMk/>
+            <pc:sldMk cId="890624571" sldId="259"/>
+            <ac:spMk id="4" creationId="{C687D823-46D0-DAA5-82E1-BEBAE00E36CD}"/>
+          </ac:spMkLst>
+        </pc:spChg>
+        <pc:spChg chg="mod">
+          <ac:chgData name="Ned Gulley" userId="3cc63692-f2ac-4e23-b89f-2e6558fa7b42" providerId="ADAL" clId="{2E93C782-0E14-416A-B059-B82164B74B38}" dt="2025-04-21T20:09:41.033" v="1025" actId="1076"/>
+          <ac:spMkLst>
+            <pc:docMk/>
+            <pc:sldMk cId="890624571" sldId="259"/>
+            <ac:spMk id="7" creationId="{2FB0E3DD-A747-FE5B-82E3-5FC4467334E5}"/>
+          </ac:spMkLst>
+        </pc:spChg>
+        <pc:spChg chg="mod">
+          <ac:chgData name="Ned Gulley" userId="3cc63692-f2ac-4e23-b89f-2e6558fa7b42" providerId="ADAL" clId="{2E93C782-0E14-416A-B059-B82164B74B38}" dt="2025-04-21T20:12:27.093" v="1050" actId="1076"/>
+          <ac:spMkLst>
+            <pc:docMk/>
+            <pc:sldMk cId="890624571" sldId="259"/>
+            <ac:spMk id="9" creationId="{055742F0-B8CA-47EA-276B-293A02F8F908}"/>
+          </ac:spMkLst>
+        </pc:spChg>
+        <pc:spChg chg="mod">
+          <ac:chgData name="Ned Gulley" userId="3cc63692-f2ac-4e23-b89f-2e6558fa7b42" providerId="ADAL" clId="{2E93C782-0E14-416A-B059-B82164B74B38}" dt="2025-04-21T20:09:11.094" v="1018" actId="1076"/>
+          <ac:spMkLst>
+            <pc:docMk/>
+            <pc:sldMk cId="890624571" sldId="259"/>
+            <ac:spMk id="12" creationId="{CB603D21-7CE5-1AF4-56DB-36675421B384}"/>
+          </ac:spMkLst>
+        </pc:spChg>
+        <pc:spChg chg="mod">
+          <ac:chgData name="Ned Gulley" userId="3cc63692-f2ac-4e23-b89f-2e6558fa7b42" providerId="ADAL" clId="{2E93C782-0E14-416A-B059-B82164B74B38}" dt="2025-04-21T20:09:00.324" v="1015" actId="1076"/>
+          <ac:spMkLst>
+            <pc:docMk/>
+            <pc:sldMk cId="890624571" sldId="259"/>
+            <ac:spMk id="14" creationId="{CCC2DDAB-555F-922C-C37C-83D540542F84}"/>
+          </ac:spMkLst>
+        </pc:spChg>
+        <pc:spChg chg="del">
+          <ac:chgData name="Ned Gulley" userId="3cc63692-f2ac-4e23-b89f-2e6558fa7b42" providerId="ADAL" clId="{2E93C782-0E14-416A-B059-B82164B74B38}" dt="2025-04-21T20:06:09.251" v="996" actId="478"/>
+          <ac:spMkLst>
+            <pc:docMk/>
+            <pc:sldMk cId="890624571" sldId="259"/>
+            <ac:spMk id="16" creationId="{1FB11CCE-13CF-73CC-FE9C-3009B1E3B6C8}"/>
+          </ac:spMkLst>
+        </pc:spChg>
+        <pc:spChg chg="del">
+          <ac:chgData name="Ned Gulley" userId="3cc63692-f2ac-4e23-b89f-2e6558fa7b42" providerId="ADAL" clId="{2E93C782-0E14-416A-B059-B82164B74B38}" dt="2025-04-21T20:06:09.251" v="996" actId="478"/>
+          <ac:spMkLst>
+            <pc:docMk/>
+            <pc:sldMk cId="890624571" sldId="259"/>
+            <ac:spMk id="18" creationId="{885565AA-5D5A-4D58-2E80-DAD34410F7EA}"/>
+          </ac:spMkLst>
+        </pc:spChg>
+        <pc:spChg chg="del">
+          <ac:chgData name="Ned Gulley" userId="3cc63692-f2ac-4e23-b89f-2e6558fa7b42" providerId="ADAL" clId="{2E93C782-0E14-416A-B059-B82164B74B38}" dt="2025-04-21T20:12:47.117" v="1064" actId="478"/>
+          <ac:spMkLst>
+            <pc:docMk/>
+            <pc:sldMk cId="890624571" sldId="259"/>
+            <ac:spMk id="21" creationId="{A0EB3B1D-9C69-BAC7-CC2E-8CD6C34E5197}"/>
+          </ac:spMkLst>
+        </pc:spChg>
+        <pc:spChg chg="del">
+          <ac:chgData name="Ned Gulley" userId="3cc63692-f2ac-4e23-b89f-2e6558fa7b42" providerId="ADAL" clId="{2E93C782-0E14-416A-B059-B82164B74B38}" dt="2025-04-21T20:12:47.117" v="1064" actId="478"/>
+          <ac:spMkLst>
+            <pc:docMk/>
+            <pc:sldMk cId="890624571" sldId="259"/>
+            <ac:spMk id="22" creationId="{04A01F0A-CA2B-A999-6E14-488BC1A147F9}"/>
+          </ac:spMkLst>
+        </pc:spChg>
+        <pc:spChg chg="del">
+          <ac:chgData name="Ned Gulley" userId="3cc63692-f2ac-4e23-b89f-2e6558fa7b42" providerId="ADAL" clId="{2E93C782-0E14-416A-B059-B82164B74B38}" dt="2025-04-21T20:12:47.117" v="1064" actId="478"/>
+          <ac:spMkLst>
+            <pc:docMk/>
+            <pc:sldMk cId="890624571" sldId="259"/>
+            <ac:spMk id="32" creationId="{85A2770D-E9D3-B364-DFA1-F65247165DA6}"/>
+          </ac:spMkLst>
+        </pc:spChg>
+        <pc:spChg chg="del">
+          <ac:chgData name="Ned Gulley" userId="3cc63692-f2ac-4e23-b89f-2e6558fa7b42" providerId="ADAL" clId="{2E93C782-0E14-416A-B059-B82164B74B38}" dt="2025-04-21T20:12:47.117" v="1064" actId="478"/>
+          <ac:spMkLst>
+            <pc:docMk/>
+            <pc:sldMk cId="890624571" sldId="259"/>
+            <ac:spMk id="44" creationId="{6D4DD015-08A0-CF00-4B8F-AD5B16843046}"/>
+          </ac:spMkLst>
+        </pc:spChg>
+        <pc:spChg chg="add mod">
+          <ac:chgData name="Ned Gulley" userId="3cc63692-f2ac-4e23-b89f-2e6558fa7b42" providerId="ADAL" clId="{2E93C782-0E14-416A-B059-B82164B74B38}" dt="2025-04-21T20:09:31.922" v="1023" actId="1076"/>
+          <ac:spMkLst>
+            <pc:docMk/>
+            <pc:sldMk cId="890624571" sldId="259"/>
+            <ac:spMk id="54" creationId="{6D9981EF-A2B6-8168-2288-1293D0EAFB4C}"/>
+          </ac:spMkLst>
+        </pc:spChg>
+        <pc:spChg chg="del">
+          <ac:chgData name="Ned Gulley" userId="3cc63692-f2ac-4e23-b89f-2e6558fa7b42" providerId="ADAL" clId="{2E93C782-0E14-416A-B059-B82164B74B38}" dt="2025-04-21T20:13:27.197" v="1065" actId="478"/>
+          <ac:spMkLst>
+            <pc:docMk/>
+            <pc:sldMk cId="890624571" sldId="259"/>
+            <ac:spMk id="55" creationId="{43D492F0-DCBE-3AD1-1735-C38D85B95C70}"/>
+          </ac:spMkLst>
+        </pc:spChg>
+        <pc:spChg chg="del">
+          <ac:chgData name="Ned Gulley" userId="3cc63692-f2ac-4e23-b89f-2e6558fa7b42" providerId="ADAL" clId="{2E93C782-0E14-416A-B059-B82164B74B38}" dt="2025-04-21T20:06:03.480" v="995" actId="478"/>
+          <ac:spMkLst>
+            <pc:docMk/>
+            <pc:sldMk cId="890624571" sldId="259"/>
+            <ac:spMk id="56" creationId="{8B19F19B-E99C-FEEF-A85A-A5576087C6E1}"/>
+          </ac:spMkLst>
+        </pc:spChg>
+        <pc:spChg chg="del">
+          <ac:chgData name="Ned Gulley" userId="3cc63692-f2ac-4e23-b89f-2e6558fa7b42" providerId="ADAL" clId="{2E93C782-0E14-416A-B059-B82164B74B38}" dt="2025-04-21T20:06:03.480" v="995" actId="478"/>
+          <ac:spMkLst>
+            <pc:docMk/>
+            <pc:sldMk cId="890624571" sldId="259"/>
+            <ac:spMk id="57" creationId="{7FA0CA44-455E-BE20-3CA0-98AF08D1E2D4}"/>
+          </ac:spMkLst>
+        </pc:spChg>
+        <pc:spChg chg="add mod">
+          <ac:chgData name="Ned Gulley" userId="3cc63692-f2ac-4e23-b89f-2e6558fa7b42" providerId="ADAL" clId="{2E93C782-0E14-416A-B059-B82164B74B38}" dt="2025-04-21T20:11:48.605" v="1034" actId="20577"/>
+          <ac:spMkLst>
+            <pc:docMk/>
+            <pc:sldMk cId="890624571" sldId="259"/>
+            <ac:spMk id="58" creationId="{26A3D9BB-1A9F-F4F7-D7C4-5EE140FD913A}"/>
+          </ac:spMkLst>
+        </pc:spChg>
+        <pc:spChg chg="add mod">
+          <ac:chgData name="Ned Gulley" userId="3cc63692-f2ac-4e23-b89f-2e6558fa7b42" providerId="ADAL" clId="{2E93C782-0E14-416A-B059-B82164B74B38}" dt="2025-04-21T20:12:11.165" v="1041" actId="20577"/>
+          <ac:spMkLst>
+            <pc:docMk/>
+            <pc:sldMk cId="890624571" sldId="259"/>
+            <ac:spMk id="59" creationId="{56D8F481-0556-F77F-CFC2-29E579BCE293}"/>
+          </ac:spMkLst>
+        </pc:spChg>
+        <pc:spChg chg="add mod">
+          <ac:chgData name="Ned Gulley" userId="3cc63692-f2ac-4e23-b89f-2e6558fa7b42" providerId="ADAL" clId="{2E93C782-0E14-416A-B059-B82164B74B38}" dt="2025-04-21T20:12:21.725" v="1048" actId="20577"/>
+          <ac:spMkLst>
+            <pc:docMk/>
+            <pc:sldMk cId="890624571" sldId="259"/>
+            <ac:spMk id="60" creationId="{14EE2104-50B4-F0A6-401D-90E894F7AF6D}"/>
+          </ac:spMkLst>
+        </pc:spChg>
+        <pc:spChg chg="add mod">
+          <ac:chgData name="Ned Gulley" userId="3cc63692-f2ac-4e23-b89f-2e6558fa7b42" providerId="ADAL" clId="{2E93C782-0E14-416A-B059-B82164B74B38}" dt="2025-04-21T20:12:39.126" v="1063" actId="20577"/>
+          <ac:spMkLst>
+            <pc:docMk/>
+            <pc:sldMk cId="890624571" sldId="259"/>
+            <ac:spMk id="61" creationId="{E26FF0A0-45C0-DC14-E481-D97225D5BBD9}"/>
+          </ac:spMkLst>
+        </pc:spChg>
+      </pc:sldChg>
     </pc:docChg>
   </pc:docChgLst>
 </pc:chgInfo>
@@ -1032,7 +1000,7 @@
           <a:p>
             <a:fld id="{EE606AEF-1D4D-4006-A373-63B33284AF0C}" type="datetimeFigureOut">
               <a:rPr lang="en-US" smtClean="0"/>
-              <a:t>4/16/2025</a:t>
+              <a:t>4/21/2025</a:t>
             </a:fld>
             <a:endParaRPr lang="en-US"/>
           </a:p>
@@ -1230,7 +1198,7 @@
           <a:p>
             <a:fld id="{EE606AEF-1D4D-4006-A373-63B33284AF0C}" type="datetimeFigureOut">
               <a:rPr lang="en-US" smtClean="0"/>
-              <a:t>4/16/2025</a:t>
+              <a:t>4/21/2025</a:t>
             </a:fld>
             <a:endParaRPr lang="en-US"/>
           </a:p>
@@ -1438,7 +1406,7 @@
           <a:p>
             <a:fld id="{EE606AEF-1D4D-4006-A373-63B33284AF0C}" type="datetimeFigureOut">
               <a:rPr lang="en-US" smtClean="0"/>
-              <a:t>4/16/2025</a:t>
+              <a:t>4/21/2025</a:t>
             </a:fld>
             <a:endParaRPr lang="en-US"/>
           </a:p>
@@ -1636,7 +1604,7 @@
           <a:p>
             <a:fld id="{EE606AEF-1D4D-4006-A373-63B33284AF0C}" type="datetimeFigureOut">
               <a:rPr lang="en-US" smtClean="0"/>
-              <a:t>4/16/2025</a:t>
+              <a:t>4/21/2025</a:t>
             </a:fld>
             <a:endParaRPr lang="en-US"/>
           </a:p>
@@ -1911,7 +1879,7 @@
           <a:p>
             <a:fld id="{EE606AEF-1D4D-4006-A373-63B33284AF0C}" type="datetimeFigureOut">
               <a:rPr lang="en-US" smtClean="0"/>
-              <a:t>4/16/2025</a:t>
+              <a:t>4/21/2025</a:t>
             </a:fld>
             <a:endParaRPr lang="en-US"/>
           </a:p>
@@ -2176,7 +2144,7 @@
           <a:p>
             <a:fld id="{EE606AEF-1D4D-4006-A373-63B33284AF0C}" type="datetimeFigureOut">
               <a:rPr lang="en-US" smtClean="0"/>
-              <a:t>4/16/2025</a:t>
+              <a:t>4/21/2025</a:t>
             </a:fld>
             <a:endParaRPr lang="en-US"/>
           </a:p>
@@ -2588,7 +2556,7 @@
           <a:p>
             <a:fld id="{EE606AEF-1D4D-4006-A373-63B33284AF0C}" type="datetimeFigureOut">
               <a:rPr lang="en-US" smtClean="0"/>
-              <a:t>4/16/2025</a:t>
+              <a:t>4/21/2025</a:t>
             </a:fld>
             <a:endParaRPr lang="en-US"/>
           </a:p>
@@ -2729,7 +2697,7 @@
           <a:p>
             <a:fld id="{EE606AEF-1D4D-4006-A373-63B33284AF0C}" type="datetimeFigureOut">
               <a:rPr lang="en-US" smtClean="0"/>
-              <a:t>4/16/2025</a:t>
+              <a:t>4/21/2025</a:t>
             </a:fld>
             <a:endParaRPr lang="en-US"/>
           </a:p>
@@ -2842,7 +2810,7 @@
           <a:p>
             <a:fld id="{EE606AEF-1D4D-4006-A373-63B33284AF0C}" type="datetimeFigureOut">
               <a:rPr lang="en-US" smtClean="0"/>
-              <a:t>4/16/2025</a:t>
+              <a:t>4/21/2025</a:t>
             </a:fld>
             <a:endParaRPr lang="en-US"/>
           </a:p>
@@ -3153,7 +3121,7 @@
           <a:p>
             <a:fld id="{EE606AEF-1D4D-4006-A373-63B33284AF0C}" type="datetimeFigureOut">
               <a:rPr lang="en-US" smtClean="0"/>
-              <a:t>4/16/2025</a:t>
+              <a:t>4/21/2025</a:t>
             </a:fld>
             <a:endParaRPr lang="en-US"/>
           </a:p>
@@ -3441,7 +3409,7 @@
           <a:p>
             <a:fld id="{EE606AEF-1D4D-4006-A373-63B33284AF0C}" type="datetimeFigureOut">
               <a:rPr lang="en-US" smtClean="0"/>
-              <a:t>4/16/2025</a:t>
+              <a:t>4/21/2025</a:t>
             </a:fld>
             <a:endParaRPr lang="en-US"/>
           </a:p>
@@ -3682,7 +3650,7 @@
           <a:p>
             <a:fld id="{EE606AEF-1D4D-4006-A373-63B33284AF0C}" type="datetimeFigureOut">
               <a:rPr lang="en-US" smtClean="0"/>
-              <a:t>4/16/2025</a:t>
+              <a:t>4/21/2025</a:t>
             </a:fld>
             <a:endParaRPr lang="en-US"/>
           </a:p>
@@ -8106,6 +8074,2381 @@
         <p:cNvPr id="1" name="">
           <a:extLst>
             <a:ext uri="{FF2B5EF4-FFF2-40B4-BE49-F238E27FC236}">
+              <a16:creationId xmlns:a16="http://schemas.microsoft.com/office/drawing/2014/main" id="{D15D3DF9-F103-345D-9DC0-1CD5296992EB}"/>
+            </a:ext>
+          </a:extLst>
+        </p:cNvPr>
+        <p:cNvGrpSpPr/>
+        <p:nvPr/>
+      </p:nvGrpSpPr>
+      <p:grpSpPr>
+        <a:xfrm>
+          <a:off x="0" y="0"/>
+          <a:ext cx="0" cy="0"/>
+          <a:chOff x="0" y="0"/>
+          <a:chExt cx="0" cy="0"/>
+        </a:xfrm>
+      </p:grpSpPr>
+      <p:sp>
+        <p:nvSpPr>
+          <p:cNvPr id="45" name="Rectangle 44">
+            <a:extLst>
+              <a:ext uri="{FF2B5EF4-FFF2-40B4-BE49-F238E27FC236}">
+                <a16:creationId xmlns:a16="http://schemas.microsoft.com/office/drawing/2014/main" id="{5742F14A-CC1B-E946-5E4A-F4E18D5115E7}"/>
+              </a:ext>
+            </a:extLst>
+          </p:cNvPr>
+          <p:cNvSpPr/>
+          <p:nvPr/>
+        </p:nvSpPr>
+        <p:spPr>
+          <a:xfrm>
+            <a:off x="3179748" y="1072127"/>
+            <a:ext cx="4987124" cy="4987124"/>
+          </a:xfrm>
+          <a:prstGeom prst="rect">
+            <a:avLst/>
+          </a:prstGeom>
+          <a:noFill/>
+          <a:ln>
+            <a:solidFill>
+              <a:schemeClr val="accent1">
+                <a:shade val="15000"/>
+              </a:schemeClr>
+            </a:solidFill>
+          </a:ln>
+        </p:spPr>
+        <p:style>
+          <a:lnRef idx="2">
+            <a:schemeClr val="accent1">
+              <a:shade val="15000"/>
+            </a:schemeClr>
+          </a:lnRef>
+          <a:fillRef idx="1">
+            <a:schemeClr val="accent1"/>
+          </a:fillRef>
+          <a:effectRef idx="0">
+            <a:schemeClr val="accent1"/>
+          </a:effectRef>
+          <a:fontRef idx="minor">
+            <a:schemeClr val="lt1"/>
+          </a:fontRef>
+        </p:style>
+        <p:txBody>
+          <a:bodyPr rtlCol="0" anchor="ctr"/>
+          <a:lstStyle/>
+          <a:p>
+            <a:pPr algn="ctr"/>
+            <a:endParaRPr lang="en-US"/>
+          </a:p>
+        </p:txBody>
+      </p:sp>
+      <p:sp>
+        <p:nvSpPr>
+          <p:cNvPr id="6" name="Oval 5">
+            <a:extLst>
+              <a:ext uri="{FF2B5EF4-FFF2-40B4-BE49-F238E27FC236}">
+                <a16:creationId xmlns:a16="http://schemas.microsoft.com/office/drawing/2014/main" id="{07F4DD59-2DDB-444F-8DC2-530226A881E0}"/>
+              </a:ext>
+            </a:extLst>
+          </p:cNvPr>
+          <p:cNvSpPr/>
+          <p:nvPr/>
+        </p:nvSpPr>
+        <p:spPr>
+          <a:xfrm>
+            <a:off x="4299447" y="2153920"/>
+            <a:ext cx="2626360" cy="2626360"/>
+          </a:xfrm>
+          <a:prstGeom prst="ellipse">
+            <a:avLst/>
+          </a:prstGeom>
+          <a:noFill/>
+          <a:ln w="38100">
+            <a:solidFill>
+              <a:schemeClr val="bg2">
+                <a:lumMod val="50000"/>
+              </a:schemeClr>
+            </a:solidFill>
+          </a:ln>
+        </p:spPr>
+        <p:style>
+          <a:lnRef idx="2">
+            <a:schemeClr val="accent1">
+              <a:shade val="15000"/>
+            </a:schemeClr>
+          </a:lnRef>
+          <a:fillRef idx="1">
+            <a:schemeClr val="accent1"/>
+          </a:fillRef>
+          <a:effectRef idx="0">
+            <a:schemeClr val="accent1"/>
+          </a:effectRef>
+          <a:fontRef idx="minor">
+            <a:schemeClr val="lt1"/>
+          </a:fontRef>
+        </p:style>
+        <p:txBody>
+          <a:bodyPr rtlCol="0" anchor="ctr"/>
+          <a:lstStyle/>
+          <a:p>
+            <a:pPr algn="ctr"/>
+            <a:endParaRPr lang="en-US"/>
+          </a:p>
+        </p:txBody>
+      </p:sp>
+      <p:sp>
+        <p:nvSpPr>
+          <p:cNvPr id="8" name="Oval 7">
+            <a:extLst>
+              <a:ext uri="{FF2B5EF4-FFF2-40B4-BE49-F238E27FC236}">
+                <a16:creationId xmlns:a16="http://schemas.microsoft.com/office/drawing/2014/main" id="{C7611612-D6B9-561C-A08D-CEA648E0AC98}"/>
+              </a:ext>
+            </a:extLst>
+          </p:cNvPr>
+          <p:cNvSpPr/>
+          <p:nvPr/>
+        </p:nvSpPr>
+        <p:spPr>
+          <a:xfrm>
+            <a:off x="4893807" y="2791461"/>
+            <a:ext cx="1405393" cy="1404620"/>
+          </a:xfrm>
+          <a:prstGeom prst="ellipse">
+            <a:avLst/>
+          </a:prstGeom>
+          <a:noFill/>
+          <a:ln w="38100">
+            <a:solidFill>
+              <a:schemeClr val="bg2">
+                <a:lumMod val="50000"/>
+              </a:schemeClr>
+            </a:solidFill>
+          </a:ln>
+        </p:spPr>
+        <p:style>
+          <a:lnRef idx="2">
+            <a:schemeClr val="accent1">
+              <a:shade val="15000"/>
+            </a:schemeClr>
+          </a:lnRef>
+          <a:fillRef idx="1">
+            <a:schemeClr val="accent1"/>
+          </a:fillRef>
+          <a:effectRef idx="0">
+            <a:schemeClr val="accent1"/>
+          </a:effectRef>
+          <a:fontRef idx="minor">
+            <a:schemeClr val="lt1"/>
+          </a:fontRef>
+        </p:style>
+        <p:txBody>
+          <a:bodyPr rtlCol="0" anchor="ctr"/>
+          <a:lstStyle/>
+          <a:p>
+            <a:pPr algn="ctr"/>
+            <a:endParaRPr lang="en-US" dirty="0"/>
+          </a:p>
+        </p:txBody>
+      </p:sp>
+      <p:cxnSp>
+        <p:nvCxnSpPr>
+          <p:cNvPr id="10" name="Straight Connector 9">
+            <a:extLst>
+              <a:ext uri="{FF2B5EF4-FFF2-40B4-BE49-F238E27FC236}">
+                <a16:creationId xmlns:a16="http://schemas.microsoft.com/office/drawing/2014/main" id="{611AEE8A-17CF-AAAB-0794-829DE076E1E2}"/>
+              </a:ext>
+            </a:extLst>
+          </p:cNvPr>
+          <p:cNvCxnSpPr/>
+          <p:nvPr/>
+        </p:nvCxnSpPr>
+        <p:spPr>
+          <a:xfrm flipV="1">
+            <a:off x="6502400" y="1995998"/>
+            <a:ext cx="477962" cy="477962"/>
+          </a:xfrm>
+          <a:prstGeom prst="line">
+            <a:avLst/>
+          </a:prstGeom>
+          <a:ln w="38100">
+            <a:solidFill>
+              <a:schemeClr val="bg2">
+                <a:lumMod val="50000"/>
+              </a:schemeClr>
+            </a:solidFill>
+          </a:ln>
+        </p:spPr>
+        <p:style>
+          <a:lnRef idx="2">
+            <a:schemeClr val="accent1"/>
+          </a:lnRef>
+          <a:fillRef idx="0">
+            <a:schemeClr val="accent1"/>
+          </a:fillRef>
+          <a:effectRef idx="1">
+            <a:schemeClr val="accent1"/>
+          </a:effectRef>
+          <a:fontRef idx="minor">
+            <a:schemeClr val="tx1"/>
+          </a:fontRef>
+        </p:style>
+      </p:cxnSp>
+      <p:cxnSp>
+        <p:nvCxnSpPr>
+          <p:cNvPr id="11" name="Straight Connector 10">
+            <a:extLst>
+              <a:ext uri="{FF2B5EF4-FFF2-40B4-BE49-F238E27FC236}">
+                <a16:creationId xmlns:a16="http://schemas.microsoft.com/office/drawing/2014/main" id="{A9A246B5-8339-B33D-3BE8-6751DD369346}"/>
+              </a:ext>
+            </a:extLst>
+          </p:cNvPr>
+          <p:cNvCxnSpPr>
+            <a:cxnSpLocks/>
+          </p:cNvCxnSpPr>
+          <p:nvPr/>
+        </p:nvCxnSpPr>
+        <p:spPr>
+          <a:xfrm>
+            <a:off x="6720840" y="4135120"/>
+            <a:ext cx="723237" cy="396240"/>
+          </a:xfrm>
+          <a:prstGeom prst="line">
+            <a:avLst/>
+          </a:prstGeom>
+          <a:ln w="38100">
+            <a:solidFill>
+              <a:schemeClr val="bg2">
+                <a:lumMod val="50000"/>
+              </a:schemeClr>
+            </a:solidFill>
+          </a:ln>
+        </p:spPr>
+        <p:style>
+          <a:lnRef idx="2">
+            <a:schemeClr val="accent1"/>
+          </a:lnRef>
+          <a:fillRef idx="0">
+            <a:schemeClr val="accent1"/>
+          </a:fillRef>
+          <a:effectRef idx="1">
+            <a:schemeClr val="accent1"/>
+          </a:effectRef>
+          <a:fontRef idx="minor">
+            <a:schemeClr val="tx1"/>
+          </a:fontRef>
+        </p:style>
+      </p:cxnSp>
+      <p:cxnSp>
+        <p:nvCxnSpPr>
+          <p:cNvPr id="13" name="Straight Connector 12">
+            <a:extLst>
+              <a:ext uri="{FF2B5EF4-FFF2-40B4-BE49-F238E27FC236}">
+                <a16:creationId xmlns:a16="http://schemas.microsoft.com/office/drawing/2014/main" id="{D72C63E6-6866-CB59-7E93-E7FADC9C28D6}"/>
+              </a:ext>
+            </a:extLst>
+          </p:cNvPr>
+          <p:cNvCxnSpPr>
+            <a:cxnSpLocks/>
+          </p:cNvCxnSpPr>
+          <p:nvPr/>
+        </p:nvCxnSpPr>
+        <p:spPr>
+          <a:xfrm flipH="1">
+            <a:off x="4648200" y="4562282"/>
+            <a:ext cx="257590" cy="375920"/>
+          </a:xfrm>
+          <a:prstGeom prst="line">
+            <a:avLst/>
+          </a:prstGeom>
+          <a:ln w="38100">
+            <a:solidFill>
+              <a:schemeClr val="bg2">
+                <a:lumMod val="50000"/>
+              </a:schemeClr>
+            </a:solidFill>
+          </a:ln>
+        </p:spPr>
+        <p:style>
+          <a:lnRef idx="2">
+            <a:schemeClr val="accent1"/>
+          </a:lnRef>
+          <a:fillRef idx="0">
+            <a:schemeClr val="accent1"/>
+          </a:fillRef>
+          <a:effectRef idx="1">
+            <a:schemeClr val="accent1"/>
+          </a:effectRef>
+          <a:fontRef idx="minor">
+            <a:schemeClr val="tx1"/>
+          </a:fontRef>
+        </p:style>
+      </p:cxnSp>
+      <p:cxnSp>
+        <p:nvCxnSpPr>
+          <p:cNvPr id="15" name="Straight Connector 14">
+            <a:extLst>
+              <a:ext uri="{FF2B5EF4-FFF2-40B4-BE49-F238E27FC236}">
+                <a16:creationId xmlns:a16="http://schemas.microsoft.com/office/drawing/2014/main" id="{D0848392-60C6-9115-4E69-DEC6188D3D95}"/>
+              </a:ext>
+            </a:extLst>
+          </p:cNvPr>
+          <p:cNvCxnSpPr>
+            <a:cxnSpLocks/>
+          </p:cNvCxnSpPr>
+          <p:nvPr/>
+        </p:nvCxnSpPr>
+        <p:spPr>
+          <a:xfrm flipH="1" flipV="1">
+            <a:off x="3745617" y="3159760"/>
+            <a:ext cx="577630" cy="81280"/>
+          </a:xfrm>
+          <a:prstGeom prst="line">
+            <a:avLst/>
+          </a:prstGeom>
+          <a:ln w="38100">
+            <a:solidFill>
+              <a:schemeClr val="bg2">
+                <a:lumMod val="50000"/>
+              </a:schemeClr>
+            </a:solidFill>
+          </a:ln>
+        </p:spPr>
+        <p:style>
+          <a:lnRef idx="2">
+            <a:schemeClr val="accent1"/>
+          </a:lnRef>
+          <a:fillRef idx="0">
+            <a:schemeClr val="accent1"/>
+          </a:fillRef>
+          <a:effectRef idx="1">
+            <a:schemeClr val="accent1"/>
+          </a:effectRef>
+          <a:fontRef idx="minor">
+            <a:schemeClr val="tx1"/>
+          </a:fontRef>
+        </p:style>
+      </p:cxnSp>
+      <p:cxnSp>
+        <p:nvCxnSpPr>
+          <p:cNvPr id="17" name="Straight Connector 16">
+            <a:extLst>
+              <a:ext uri="{FF2B5EF4-FFF2-40B4-BE49-F238E27FC236}">
+                <a16:creationId xmlns:a16="http://schemas.microsoft.com/office/drawing/2014/main" id="{69AAC175-2717-4F87-647F-B2BA43F880C1}"/>
+              </a:ext>
+            </a:extLst>
+          </p:cNvPr>
+          <p:cNvCxnSpPr>
+            <a:cxnSpLocks/>
+          </p:cNvCxnSpPr>
+          <p:nvPr/>
+        </p:nvCxnSpPr>
+        <p:spPr>
+          <a:xfrm flipV="1">
+            <a:off x="6360160" y="2275422"/>
+            <a:ext cx="55880" cy="91858"/>
+          </a:xfrm>
+          <a:prstGeom prst="line">
+            <a:avLst/>
+          </a:prstGeom>
+          <a:ln w="38100">
+            <a:solidFill>
+              <a:schemeClr val="bg2">
+                <a:lumMod val="50000"/>
+              </a:schemeClr>
+            </a:solidFill>
+          </a:ln>
+        </p:spPr>
+        <p:style>
+          <a:lnRef idx="2">
+            <a:schemeClr val="accent1"/>
+          </a:lnRef>
+          <a:fillRef idx="0">
+            <a:schemeClr val="accent1"/>
+          </a:fillRef>
+          <a:effectRef idx="1">
+            <a:schemeClr val="accent1"/>
+          </a:effectRef>
+          <a:fontRef idx="minor">
+            <a:schemeClr val="tx1"/>
+          </a:fontRef>
+        </p:style>
+      </p:cxnSp>
+      <p:cxnSp>
+        <p:nvCxnSpPr>
+          <p:cNvPr id="19" name="Straight Connector 18">
+            <a:extLst>
+              <a:ext uri="{FF2B5EF4-FFF2-40B4-BE49-F238E27FC236}">
+                <a16:creationId xmlns:a16="http://schemas.microsoft.com/office/drawing/2014/main" id="{1188CAF3-81A5-C68F-AA0F-55D7309D31BE}"/>
+              </a:ext>
+            </a:extLst>
+          </p:cNvPr>
+          <p:cNvCxnSpPr>
+            <a:cxnSpLocks/>
+          </p:cNvCxnSpPr>
+          <p:nvPr/>
+        </p:nvCxnSpPr>
+        <p:spPr>
+          <a:xfrm flipH="1">
+            <a:off x="5490074" y="4775421"/>
+            <a:ext cx="15240" cy="162781"/>
+          </a:xfrm>
+          <a:prstGeom prst="line">
+            <a:avLst/>
+          </a:prstGeom>
+          <a:ln w="38100">
+            <a:solidFill>
+              <a:schemeClr val="bg2">
+                <a:lumMod val="50000"/>
+              </a:schemeClr>
+            </a:solidFill>
+          </a:ln>
+        </p:spPr>
+        <p:style>
+          <a:lnRef idx="2">
+            <a:schemeClr val="accent1"/>
+          </a:lnRef>
+          <a:fillRef idx="0">
+            <a:schemeClr val="accent1"/>
+          </a:fillRef>
+          <a:effectRef idx="1">
+            <a:schemeClr val="accent1"/>
+          </a:effectRef>
+          <a:fontRef idx="minor">
+            <a:schemeClr val="tx1"/>
+          </a:fontRef>
+        </p:style>
+      </p:cxnSp>
+      <p:cxnSp>
+        <p:nvCxnSpPr>
+          <p:cNvPr id="20" name="Straight Connector 19">
+            <a:extLst>
+              <a:ext uri="{FF2B5EF4-FFF2-40B4-BE49-F238E27FC236}">
+                <a16:creationId xmlns:a16="http://schemas.microsoft.com/office/drawing/2014/main" id="{A6D96B76-F20D-AA17-D821-72F83DFF888F}"/>
+              </a:ext>
+            </a:extLst>
+          </p:cNvPr>
+          <p:cNvCxnSpPr>
+            <a:cxnSpLocks/>
+          </p:cNvCxnSpPr>
+          <p:nvPr/>
+        </p:nvCxnSpPr>
+        <p:spPr>
+          <a:xfrm>
+            <a:off x="5591590" y="4775642"/>
+            <a:ext cx="0" cy="309438"/>
+          </a:xfrm>
+          <a:prstGeom prst="line">
+            <a:avLst/>
+          </a:prstGeom>
+          <a:ln w="38100">
+            <a:solidFill>
+              <a:schemeClr val="bg2">
+                <a:lumMod val="50000"/>
+              </a:schemeClr>
+            </a:solidFill>
+          </a:ln>
+        </p:spPr>
+        <p:style>
+          <a:lnRef idx="2">
+            <a:schemeClr val="accent1"/>
+          </a:lnRef>
+          <a:fillRef idx="0">
+            <a:schemeClr val="accent1"/>
+          </a:fillRef>
+          <a:effectRef idx="1">
+            <a:schemeClr val="accent1"/>
+          </a:effectRef>
+          <a:fontRef idx="minor">
+            <a:schemeClr val="tx1"/>
+          </a:fontRef>
+        </p:style>
+      </p:cxnSp>
+      <p:sp>
+        <p:nvSpPr>
+          <p:cNvPr id="23" name="Oval 22">
+            <a:extLst>
+              <a:ext uri="{FF2B5EF4-FFF2-40B4-BE49-F238E27FC236}">
+                <a16:creationId xmlns:a16="http://schemas.microsoft.com/office/drawing/2014/main" id="{41751384-A78D-D560-95B2-EF017E58BBE5}"/>
+              </a:ext>
+            </a:extLst>
+          </p:cNvPr>
+          <p:cNvSpPr/>
+          <p:nvPr/>
+        </p:nvSpPr>
+        <p:spPr>
+          <a:xfrm>
+            <a:off x="6299200" y="1823720"/>
+            <a:ext cx="477962" cy="477962"/>
+          </a:xfrm>
+          <a:prstGeom prst="ellipse">
+            <a:avLst/>
+          </a:prstGeom>
+          <a:ln w="38100">
+            <a:solidFill>
+              <a:schemeClr val="bg2">
+                <a:lumMod val="50000"/>
+              </a:schemeClr>
+            </a:solidFill>
+          </a:ln>
+        </p:spPr>
+        <p:style>
+          <a:lnRef idx="2">
+            <a:schemeClr val="accent1">
+              <a:shade val="15000"/>
+            </a:schemeClr>
+          </a:lnRef>
+          <a:fillRef idx="1">
+            <a:schemeClr val="accent1"/>
+          </a:fillRef>
+          <a:effectRef idx="0">
+            <a:schemeClr val="accent1"/>
+          </a:effectRef>
+          <a:fontRef idx="minor">
+            <a:schemeClr val="lt1"/>
+          </a:fontRef>
+        </p:style>
+        <p:txBody>
+          <a:bodyPr rtlCol="0" anchor="ctr"/>
+          <a:lstStyle/>
+          <a:p>
+            <a:pPr algn="ctr"/>
+            <a:r>
+              <a:rPr lang="en-US" b="0" i="0" dirty="0">
+                <a:solidFill>
+                  <a:schemeClr val="bg1"/>
+                </a:solidFill>
+                <a:effectLst/>
+                <a:latin typeface="Arial" panose="020B0604020202020204" pitchFamily="34" charset="0"/>
+              </a:rPr>
+              <a:t>☽︎</a:t>
+            </a:r>
+            <a:endParaRPr lang="en-US" dirty="0">
+              <a:solidFill>
+                <a:schemeClr val="bg1"/>
+              </a:solidFill>
+            </a:endParaRPr>
+          </a:p>
+        </p:txBody>
+      </p:sp>
+      <p:sp>
+        <p:nvSpPr>
+          <p:cNvPr id="24" name="Oval 23">
+            <a:extLst>
+              <a:ext uri="{FF2B5EF4-FFF2-40B4-BE49-F238E27FC236}">
+                <a16:creationId xmlns:a16="http://schemas.microsoft.com/office/drawing/2014/main" id="{9F0BD4CA-FB4D-165D-72B8-D13FFCFB2268}"/>
+              </a:ext>
+            </a:extLst>
+          </p:cNvPr>
+          <p:cNvSpPr/>
+          <p:nvPr/>
+        </p:nvSpPr>
+        <p:spPr>
+          <a:xfrm>
+            <a:off x="6898640" y="1595120"/>
+            <a:ext cx="477962" cy="477962"/>
+          </a:xfrm>
+          <a:prstGeom prst="ellipse">
+            <a:avLst/>
+          </a:prstGeom>
+          <a:ln w="38100">
+            <a:solidFill>
+              <a:schemeClr val="bg2">
+                <a:lumMod val="50000"/>
+              </a:schemeClr>
+            </a:solidFill>
+          </a:ln>
+        </p:spPr>
+        <p:style>
+          <a:lnRef idx="2">
+            <a:schemeClr val="accent1">
+              <a:shade val="15000"/>
+            </a:schemeClr>
+          </a:lnRef>
+          <a:fillRef idx="1">
+            <a:schemeClr val="accent1"/>
+          </a:fillRef>
+          <a:effectRef idx="0">
+            <a:schemeClr val="accent1"/>
+          </a:effectRef>
+          <a:fontRef idx="minor">
+            <a:schemeClr val="lt1"/>
+          </a:fontRef>
+        </p:style>
+        <p:txBody>
+          <a:bodyPr rtlCol="0" anchor="ctr"/>
+          <a:lstStyle/>
+          <a:p>
+            <a:pPr algn="ctr"/>
+            <a:r>
+              <a:rPr lang="en-US" dirty="0"/>
+              <a:t>♃</a:t>
+            </a:r>
+          </a:p>
+        </p:txBody>
+      </p:sp>
+      <p:sp>
+        <p:nvSpPr>
+          <p:cNvPr id="25" name="Oval 24">
+            <a:extLst>
+              <a:ext uri="{FF2B5EF4-FFF2-40B4-BE49-F238E27FC236}">
+                <a16:creationId xmlns:a16="http://schemas.microsoft.com/office/drawing/2014/main" id="{F039B886-CBA0-48D5-5C6C-BFF74224FE4D}"/>
+              </a:ext>
+            </a:extLst>
+          </p:cNvPr>
+          <p:cNvSpPr/>
+          <p:nvPr/>
+        </p:nvSpPr>
+        <p:spPr>
+          <a:xfrm>
+            <a:off x="7411720" y="4409440"/>
+            <a:ext cx="477962" cy="477962"/>
+          </a:xfrm>
+          <a:prstGeom prst="ellipse">
+            <a:avLst/>
+          </a:prstGeom>
+          <a:ln w="38100">
+            <a:solidFill>
+              <a:schemeClr val="bg2">
+                <a:lumMod val="50000"/>
+              </a:schemeClr>
+            </a:solidFill>
+          </a:ln>
+        </p:spPr>
+        <p:style>
+          <a:lnRef idx="2">
+            <a:schemeClr val="accent1">
+              <a:shade val="15000"/>
+            </a:schemeClr>
+          </a:lnRef>
+          <a:fillRef idx="1">
+            <a:schemeClr val="accent1"/>
+          </a:fillRef>
+          <a:effectRef idx="0">
+            <a:schemeClr val="accent1"/>
+          </a:effectRef>
+          <a:fontRef idx="minor">
+            <a:schemeClr val="lt1"/>
+          </a:fontRef>
+        </p:style>
+        <p:txBody>
+          <a:bodyPr rtlCol="0" anchor="ctr"/>
+          <a:lstStyle/>
+          <a:p>
+            <a:pPr algn="ctr"/>
+            <a:r>
+              <a:rPr lang="en-US" dirty="0"/>
+              <a:t>♄</a:t>
+            </a:r>
+          </a:p>
+        </p:txBody>
+      </p:sp>
+      <p:sp>
+        <p:nvSpPr>
+          <p:cNvPr id="26" name="Oval 25">
+            <a:extLst>
+              <a:ext uri="{FF2B5EF4-FFF2-40B4-BE49-F238E27FC236}">
+                <a16:creationId xmlns:a16="http://schemas.microsoft.com/office/drawing/2014/main" id="{4B1B227E-C58D-3D27-D832-0B3480A3BBB6}"/>
+              </a:ext>
+            </a:extLst>
+          </p:cNvPr>
+          <p:cNvSpPr/>
+          <p:nvPr/>
+        </p:nvSpPr>
+        <p:spPr>
+          <a:xfrm>
+            <a:off x="4239966" y="4880002"/>
+            <a:ext cx="477962" cy="477962"/>
+          </a:xfrm>
+          <a:prstGeom prst="ellipse">
+            <a:avLst/>
+          </a:prstGeom>
+          <a:ln w="38100">
+            <a:solidFill>
+              <a:schemeClr val="bg2">
+                <a:lumMod val="50000"/>
+              </a:schemeClr>
+            </a:solidFill>
+          </a:ln>
+        </p:spPr>
+        <p:style>
+          <a:lnRef idx="2">
+            <a:schemeClr val="accent1">
+              <a:shade val="15000"/>
+            </a:schemeClr>
+          </a:lnRef>
+          <a:fillRef idx="1">
+            <a:schemeClr val="accent1"/>
+          </a:fillRef>
+          <a:effectRef idx="0">
+            <a:schemeClr val="accent1"/>
+          </a:effectRef>
+          <a:fontRef idx="minor">
+            <a:schemeClr val="lt1"/>
+          </a:fontRef>
+        </p:style>
+        <p:txBody>
+          <a:bodyPr rtlCol="0" anchor="ctr"/>
+          <a:lstStyle/>
+          <a:p>
+            <a:pPr algn="ctr"/>
+            <a:r>
+              <a:rPr lang="en-US"/>
+              <a:t>♀</a:t>
+            </a:r>
+          </a:p>
+        </p:txBody>
+      </p:sp>
+      <p:sp>
+        <p:nvSpPr>
+          <p:cNvPr id="27" name="Oval 26">
+            <a:extLst>
+              <a:ext uri="{FF2B5EF4-FFF2-40B4-BE49-F238E27FC236}">
+                <a16:creationId xmlns:a16="http://schemas.microsoft.com/office/drawing/2014/main" id="{D4A176B7-19D9-EE16-6D58-F4523AA2D326}"/>
+              </a:ext>
+            </a:extLst>
+          </p:cNvPr>
+          <p:cNvSpPr/>
+          <p:nvPr/>
+        </p:nvSpPr>
+        <p:spPr>
+          <a:xfrm>
+            <a:off x="5385849" y="5098014"/>
+            <a:ext cx="477962" cy="477962"/>
+          </a:xfrm>
+          <a:prstGeom prst="ellipse">
+            <a:avLst/>
+          </a:prstGeom>
+          <a:ln w="38100">
+            <a:solidFill>
+              <a:schemeClr val="bg2">
+                <a:lumMod val="50000"/>
+              </a:schemeClr>
+            </a:solidFill>
+          </a:ln>
+        </p:spPr>
+        <p:style>
+          <a:lnRef idx="2">
+            <a:schemeClr val="accent1">
+              <a:shade val="15000"/>
+            </a:schemeClr>
+          </a:lnRef>
+          <a:fillRef idx="1">
+            <a:schemeClr val="accent1"/>
+          </a:fillRef>
+          <a:effectRef idx="0">
+            <a:schemeClr val="accent1"/>
+          </a:effectRef>
+          <a:fontRef idx="minor">
+            <a:schemeClr val="lt1"/>
+          </a:fontRef>
+        </p:style>
+        <p:txBody>
+          <a:bodyPr rtlCol="0" anchor="ctr"/>
+          <a:lstStyle/>
+          <a:p>
+            <a:pPr algn="ctr"/>
+            <a:r>
+              <a:rPr lang="en-US" dirty="0"/>
+              <a:t>☿</a:t>
+            </a:r>
+          </a:p>
+        </p:txBody>
+      </p:sp>
+      <p:sp>
+        <p:nvSpPr>
+          <p:cNvPr id="28" name="Oval 27">
+            <a:extLst>
+              <a:ext uri="{FF2B5EF4-FFF2-40B4-BE49-F238E27FC236}">
+                <a16:creationId xmlns:a16="http://schemas.microsoft.com/office/drawing/2014/main" id="{C91C546D-781B-59E9-1443-23A4451554D2}"/>
+              </a:ext>
+            </a:extLst>
+          </p:cNvPr>
+          <p:cNvSpPr/>
+          <p:nvPr/>
+        </p:nvSpPr>
+        <p:spPr>
+          <a:xfrm>
+            <a:off x="5205515" y="4952321"/>
+            <a:ext cx="477962" cy="477962"/>
+          </a:xfrm>
+          <a:prstGeom prst="ellipse">
+            <a:avLst/>
+          </a:prstGeom>
+          <a:ln w="38100">
+            <a:solidFill>
+              <a:schemeClr val="bg2">
+                <a:lumMod val="50000"/>
+              </a:schemeClr>
+            </a:solidFill>
+          </a:ln>
+        </p:spPr>
+        <p:style>
+          <a:lnRef idx="2">
+            <a:schemeClr val="accent1">
+              <a:shade val="15000"/>
+            </a:schemeClr>
+          </a:lnRef>
+          <a:fillRef idx="1">
+            <a:schemeClr val="accent1"/>
+          </a:fillRef>
+          <a:effectRef idx="0">
+            <a:schemeClr val="accent1"/>
+          </a:effectRef>
+          <a:fontRef idx="minor">
+            <a:schemeClr val="lt1"/>
+          </a:fontRef>
+        </p:style>
+        <p:txBody>
+          <a:bodyPr rtlCol="0" anchor="ctr"/>
+          <a:lstStyle/>
+          <a:p>
+            <a:pPr algn="ctr"/>
+            <a:r>
+              <a:rPr lang="en-US" b="0" i="0" dirty="0">
+                <a:solidFill>
+                  <a:schemeClr val="bg1"/>
+                </a:solidFill>
+                <a:effectLst/>
+                <a:latin typeface="Arial" panose="020B0604020202020204" pitchFamily="34" charset="0"/>
+              </a:rPr>
+              <a:t>☉︎</a:t>
+            </a:r>
+            <a:endParaRPr lang="en-US" dirty="0">
+              <a:solidFill>
+                <a:schemeClr val="bg1"/>
+              </a:solidFill>
+            </a:endParaRPr>
+          </a:p>
+        </p:txBody>
+      </p:sp>
+      <p:sp>
+        <p:nvSpPr>
+          <p:cNvPr id="29" name="Oval 28">
+            <a:extLst>
+              <a:ext uri="{FF2B5EF4-FFF2-40B4-BE49-F238E27FC236}">
+                <a16:creationId xmlns:a16="http://schemas.microsoft.com/office/drawing/2014/main" id="{8F56A88B-924F-FC91-55D5-567D0D7A9A6B}"/>
+              </a:ext>
+            </a:extLst>
+          </p:cNvPr>
+          <p:cNvSpPr/>
+          <p:nvPr/>
+        </p:nvSpPr>
+        <p:spPr>
+          <a:xfrm>
+            <a:off x="3303215" y="2875280"/>
+            <a:ext cx="477962" cy="477962"/>
+          </a:xfrm>
+          <a:prstGeom prst="ellipse">
+            <a:avLst/>
+          </a:prstGeom>
+          <a:ln w="38100">
+            <a:solidFill>
+              <a:schemeClr val="bg2">
+                <a:lumMod val="50000"/>
+              </a:schemeClr>
+            </a:solidFill>
+          </a:ln>
+        </p:spPr>
+        <p:style>
+          <a:lnRef idx="2">
+            <a:schemeClr val="accent1">
+              <a:shade val="15000"/>
+            </a:schemeClr>
+          </a:lnRef>
+          <a:fillRef idx="1">
+            <a:schemeClr val="accent1"/>
+          </a:fillRef>
+          <a:effectRef idx="0">
+            <a:schemeClr val="accent1"/>
+          </a:effectRef>
+          <a:fontRef idx="minor">
+            <a:schemeClr val="lt1"/>
+          </a:fontRef>
+        </p:style>
+        <p:txBody>
+          <a:bodyPr rtlCol="0" anchor="ctr"/>
+          <a:lstStyle/>
+          <a:p>
+            <a:pPr algn="ctr"/>
+            <a:r>
+              <a:rPr lang="en-US" dirty="0"/>
+              <a:t>♂</a:t>
+            </a:r>
+          </a:p>
+        </p:txBody>
+      </p:sp>
+      <p:sp>
+        <p:nvSpPr>
+          <p:cNvPr id="30" name="Oval 29">
+            <a:extLst>
+              <a:ext uri="{FF2B5EF4-FFF2-40B4-BE49-F238E27FC236}">
+                <a16:creationId xmlns:a16="http://schemas.microsoft.com/office/drawing/2014/main" id="{1300C999-3857-517C-DFEB-F1ECD1319B99}"/>
+              </a:ext>
+            </a:extLst>
+          </p:cNvPr>
+          <p:cNvSpPr/>
+          <p:nvPr/>
+        </p:nvSpPr>
+        <p:spPr>
+          <a:xfrm>
+            <a:off x="5356446" y="3236402"/>
+            <a:ext cx="477962" cy="477962"/>
+          </a:xfrm>
+          <a:prstGeom prst="ellipse">
+            <a:avLst/>
+          </a:prstGeom>
+          <a:ln w="38100">
+            <a:solidFill>
+              <a:schemeClr val="bg2">
+                <a:lumMod val="50000"/>
+              </a:schemeClr>
+            </a:solidFill>
+          </a:ln>
+        </p:spPr>
+        <p:style>
+          <a:lnRef idx="2">
+            <a:schemeClr val="accent1">
+              <a:shade val="15000"/>
+            </a:schemeClr>
+          </a:lnRef>
+          <a:fillRef idx="1">
+            <a:schemeClr val="accent1"/>
+          </a:fillRef>
+          <a:effectRef idx="0">
+            <a:schemeClr val="accent1"/>
+          </a:effectRef>
+          <a:fontRef idx="minor">
+            <a:schemeClr val="lt1"/>
+          </a:fontRef>
+        </p:style>
+        <p:txBody>
+          <a:bodyPr rtlCol="0" anchor="ctr"/>
+          <a:lstStyle/>
+          <a:p>
+            <a:pPr algn="ctr"/>
+            <a:endParaRPr lang="en-US" dirty="0">
+              <a:solidFill>
+                <a:schemeClr val="bg1"/>
+              </a:solidFill>
+            </a:endParaRPr>
+          </a:p>
+        </p:txBody>
+      </p:sp>
+      <p:cxnSp>
+        <p:nvCxnSpPr>
+          <p:cNvPr id="31" name="Straight Connector 30">
+            <a:extLst>
+              <a:ext uri="{FF2B5EF4-FFF2-40B4-BE49-F238E27FC236}">
+                <a16:creationId xmlns:a16="http://schemas.microsoft.com/office/drawing/2014/main" id="{827B2E4B-89CB-5966-3FEF-53039E0FBCDA}"/>
+              </a:ext>
+            </a:extLst>
+          </p:cNvPr>
+          <p:cNvCxnSpPr>
+            <a:cxnSpLocks/>
+          </p:cNvCxnSpPr>
+          <p:nvPr/>
+        </p:nvCxnSpPr>
+        <p:spPr>
+          <a:xfrm flipV="1">
+            <a:off x="6236142" y="2857059"/>
+            <a:ext cx="477962" cy="275203"/>
+          </a:xfrm>
+          <a:prstGeom prst="line">
+            <a:avLst/>
+          </a:prstGeom>
+          <a:ln w="38100">
+            <a:solidFill>
+              <a:schemeClr val="bg2">
+                <a:lumMod val="50000"/>
+              </a:schemeClr>
+            </a:solidFill>
+          </a:ln>
+        </p:spPr>
+        <p:style>
+          <a:lnRef idx="2">
+            <a:schemeClr val="accent1"/>
+          </a:lnRef>
+          <a:fillRef idx="0">
+            <a:schemeClr val="accent1"/>
+          </a:fillRef>
+          <a:effectRef idx="1">
+            <a:schemeClr val="accent1"/>
+          </a:effectRef>
+          <a:fontRef idx="minor">
+            <a:schemeClr val="tx1"/>
+          </a:fontRef>
+        </p:style>
+      </p:cxnSp>
+      <p:cxnSp>
+        <p:nvCxnSpPr>
+          <p:cNvPr id="33" name="Straight Connector 32">
+            <a:extLst>
+              <a:ext uri="{FF2B5EF4-FFF2-40B4-BE49-F238E27FC236}">
+                <a16:creationId xmlns:a16="http://schemas.microsoft.com/office/drawing/2014/main" id="{53DB3161-E7B6-F59E-3BA2-4AF395A5DFAC}"/>
+              </a:ext>
+            </a:extLst>
+          </p:cNvPr>
+          <p:cNvCxnSpPr>
+            <a:cxnSpLocks/>
+          </p:cNvCxnSpPr>
+          <p:nvPr/>
+        </p:nvCxnSpPr>
+        <p:spPr>
+          <a:xfrm>
+            <a:off x="6307262" y="3538662"/>
+            <a:ext cx="563714" cy="71120"/>
+          </a:xfrm>
+          <a:prstGeom prst="line">
+            <a:avLst/>
+          </a:prstGeom>
+          <a:ln w="38100">
+            <a:solidFill>
+              <a:schemeClr val="bg2">
+                <a:lumMod val="50000"/>
+              </a:schemeClr>
+            </a:solidFill>
+          </a:ln>
+        </p:spPr>
+        <p:style>
+          <a:lnRef idx="2">
+            <a:schemeClr val="accent1"/>
+          </a:lnRef>
+          <a:fillRef idx="0">
+            <a:schemeClr val="accent1"/>
+          </a:fillRef>
+          <a:effectRef idx="1">
+            <a:schemeClr val="accent1"/>
+          </a:effectRef>
+          <a:fontRef idx="minor">
+            <a:schemeClr val="tx1"/>
+          </a:fontRef>
+        </p:style>
+      </p:cxnSp>
+      <p:cxnSp>
+        <p:nvCxnSpPr>
+          <p:cNvPr id="34" name="Straight Connector 33">
+            <a:extLst>
+              <a:ext uri="{FF2B5EF4-FFF2-40B4-BE49-F238E27FC236}">
+                <a16:creationId xmlns:a16="http://schemas.microsoft.com/office/drawing/2014/main" id="{88C2EAC2-5901-6705-9C23-B8F177361524}"/>
+              </a:ext>
+            </a:extLst>
+          </p:cNvPr>
+          <p:cNvCxnSpPr>
+            <a:cxnSpLocks/>
+          </p:cNvCxnSpPr>
+          <p:nvPr/>
+        </p:nvCxnSpPr>
+        <p:spPr>
+          <a:xfrm>
+            <a:off x="6205662" y="3843462"/>
+            <a:ext cx="495231" cy="286138"/>
+          </a:xfrm>
+          <a:prstGeom prst="line">
+            <a:avLst/>
+          </a:prstGeom>
+          <a:ln w="38100">
+            <a:solidFill>
+              <a:schemeClr val="bg2">
+                <a:lumMod val="50000"/>
+              </a:schemeClr>
+            </a:solidFill>
+          </a:ln>
+        </p:spPr>
+        <p:style>
+          <a:lnRef idx="2">
+            <a:schemeClr val="accent1"/>
+          </a:lnRef>
+          <a:fillRef idx="0">
+            <a:schemeClr val="accent1"/>
+          </a:fillRef>
+          <a:effectRef idx="1">
+            <a:schemeClr val="accent1"/>
+          </a:effectRef>
+          <a:fontRef idx="minor">
+            <a:schemeClr val="tx1"/>
+          </a:fontRef>
+        </p:style>
+      </p:cxnSp>
+      <p:cxnSp>
+        <p:nvCxnSpPr>
+          <p:cNvPr id="35" name="Straight Connector 34">
+            <a:extLst>
+              <a:ext uri="{FF2B5EF4-FFF2-40B4-BE49-F238E27FC236}">
+                <a16:creationId xmlns:a16="http://schemas.microsoft.com/office/drawing/2014/main" id="{327896CD-3B99-D198-59C7-1508A5C5E5D5}"/>
+              </a:ext>
+            </a:extLst>
+          </p:cNvPr>
+          <p:cNvCxnSpPr>
+            <a:cxnSpLocks/>
+          </p:cNvCxnSpPr>
+          <p:nvPr/>
+        </p:nvCxnSpPr>
+        <p:spPr>
+          <a:xfrm>
+            <a:off x="5942330" y="4118665"/>
+            <a:ext cx="277909" cy="434783"/>
+          </a:xfrm>
+          <a:prstGeom prst="line">
+            <a:avLst/>
+          </a:prstGeom>
+          <a:ln w="38100">
+            <a:solidFill>
+              <a:schemeClr val="bg2">
+                <a:lumMod val="50000"/>
+              </a:schemeClr>
+            </a:solidFill>
+          </a:ln>
+        </p:spPr>
+        <p:style>
+          <a:lnRef idx="2">
+            <a:schemeClr val="accent1"/>
+          </a:lnRef>
+          <a:fillRef idx="0">
+            <a:schemeClr val="accent1"/>
+          </a:fillRef>
+          <a:effectRef idx="1">
+            <a:schemeClr val="accent1"/>
+          </a:effectRef>
+          <a:fontRef idx="minor">
+            <a:schemeClr val="tx1"/>
+          </a:fontRef>
+        </p:style>
+      </p:cxnSp>
+      <p:cxnSp>
+        <p:nvCxnSpPr>
+          <p:cNvPr id="36" name="Straight Connector 35">
+            <a:extLst>
+              <a:ext uri="{FF2B5EF4-FFF2-40B4-BE49-F238E27FC236}">
+                <a16:creationId xmlns:a16="http://schemas.microsoft.com/office/drawing/2014/main" id="{FA9E5510-CC5D-B2D6-ACDB-03B4001E301A}"/>
+              </a:ext>
+            </a:extLst>
+          </p:cNvPr>
+          <p:cNvCxnSpPr>
+            <a:cxnSpLocks/>
+          </p:cNvCxnSpPr>
+          <p:nvPr/>
+        </p:nvCxnSpPr>
+        <p:spPr>
+          <a:xfrm flipH="1">
+            <a:off x="5504512" y="4194865"/>
+            <a:ext cx="41578" cy="509215"/>
+          </a:xfrm>
+          <a:prstGeom prst="line">
+            <a:avLst/>
+          </a:prstGeom>
+          <a:ln w="38100">
+            <a:solidFill>
+              <a:schemeClr val="bg2">
+                <a:lumMod val="50000"/>
+              </a:schemeClr>
+            </a:solidFill>
+          </a:ln>
+        </p:spPr>
+        <p:style>
+          <a:lnRef idx="2">
+            <a:schemeClr val="accent1"/>
+          </a:lnRef>
+          <a:fillRef idx="0">
+            <a:schemeClr val="accent1"/>
+          </a:fillRef>
+          <a:effectRef idx="1">
+            <a:schemeClr val="accent1"/>
+          </a:effectRef>
+          <a:fontRef idx="minor">
+            <a:schemeClr val="tx1"/>
+          </a:fontRef>
+        </p:style>
+      </p:cxnSp>
+      <p:cxnSp>
+        <p:nvCxnSpPr>
+          <p:cNvPr id="37" name="Straight Connector 36">
+            <a:extLst>
+              <a:ext uri="{FF2B5EF4-FFF2-40B4-BE49-F238E27FC236}">
+                <a16:creationId xmlns:a16="http://schemas.microsoft.com/office/drawing/2014/main" id="{9EFB76F8-B756-DCF0-F7FA-83A1271E47CF}"/>
+              </a:ext>
+            </a:extLst>
+          </p:cNvPr>
+          <p:cNvCxnSpPr>
+            <a:cxnSpLocks/>
+          </p:cNvCxnSpPr>
+          <p:nvPr/>
+        </p:nvCxnSpPr>
+        <p:spPr>
+          <a:xfrm flipH="1">
+            <a:off x="4968295" y="4108505"/>
+            <a:ext cx="257755" cy="443176"/>
+          </a:xfrm>
+          <a:prstGeom prst="line">
+            <a:avLst/>
+          </a:prstGeom>
+          <a:ln w="38100">
+            <a:solidFill>
+              <a:schemeClr val="bg2">
+                <a:lumMod val="50000"/>
+              </a:schemeClr>
+            </a:solidFill>
+          </a:ln>
+        </p:spPr>
+        <p:style>
+          <a:lnRef idx="2">
+            <a:schemeClr val="accent1"/>
+          </a:lnRef>
+          <a:fillRef idx="0">
+            <a:schemeClr val="accent1"/>
+          </a:fillRef>
+          <a:effectRef idx="1">
+            <a:schemeClr val="accent1"/>
+          </a:effectRef>
+          <a:fontRef idx="minor">
+            <a:schemeClr val="tx1"/>
+          </a:fontRef>
+        </p:style>
+      </p:cxnSp>
+      <p:cxnSp>
+        <p:nvCxnSpPr>
+          <p:cNvPr id="38" name="Straight Connector 37">
+            <a:extLst>
+              <a:ext uri="{FF2B5EF4-FFF2-40B4-BE49-F238E27FC236}">
+                <a16:creationId xmlns:a16="http://schemas.microsoft.com/office/drawing/2014/main" id="{2B962265-D287-56F7-AF6E-6D8D53A09F02}"/>
+              </a:ext>
+            </a:extLst>
+          </p:cNvPr>
+          <p:cNvCxnSpPr>
+            <a:cxnSpLocks/>
+          </p:cNvCxnSpPr>
+          <p:nvPr/>
+        </p:nvCxnSpPr>
+        <p:spPr>
+          <a:xfrm flipH="1">
+            <a:off x="4587240" y="3884985"/>
+            <a:ext cx="435610" cy="338594"/>
+          </a:xfrm>
+          <a:prstGeom prst="line">
+            <a:avLst/>
+          </a:prstGeom>
+          <a:ln w="38100">
+            <a:solidFill>
+              <a:schemeClr val="bg2">
+                <a:lumMod val="50000"/>
+              </a:schemeClr>
+            </a:solidFill>
+          </a:ln>
+        </p:spPr>
+        <p:style>
+          <a:lnRef idx="2">
+            <a:schemeClr val="accent1"/>
+          </a:lnRef>
+          <a:fillRef idx="0">
+            <a:schemeClr val="accent1"/>
+          </a:fillRef>
+          <a:effectRef idx="1">
+            <a:schemeClr val="accent1"/>
+          </a:effectRef>
+          <a:fontRef idx="minor">
+            <a:schemeClr val="tx1"/>
+          </a:fontRef>
+        </p:style>
+      </p:cxnSp>
+      <p:cxnSp>
+        <p:nvCxnSpPr>
+          <p:cNvPr id="39" name="Straight Connector 38">
+            <a:extLst>
+              <a:ext uri="{FF2B5EF4-FFF2-40B4-BE49-F238E27FC236}">
+                <a16:creationId xmlns:a16="http://schemas.microsoft.com/office/drawing/2014/main" id="{CFF7BE86-2CA2-A1F9-DBC6-DC36B9F605A0}"/>
+              </a:ext>
+            </a:extLst>
+          </p:cNvPr>
+          <p:cNvCxnSpPr>
+            <a:cxnSpLocks/>
+          </p:cNvCxnSpPr>
+          <p:nvPr/>
+        </p:nvCxnSpPr>
+        <p:spPr>
+          <a:xfrm flipH="1" flipV="1">
+            <a:off x="4333407" y="3331073"/>
+            <a:ext cx="552283" cy="56072"/>
+          </a:xfrm>
+          <a:prstGeom prst="line">
+            <a:avLst/>
+          </a:prstGeom>
+          <a:ln w="38100">
+            <a:solidFill>
+              <a:schemeClr val="bg2">
+                <a:lumMod val="50000"/>
+              </a:schemeClr>
+            </a:solidFill>
+          </a:ln>
+        </p:spPr>
+        <p:style>
+          <a:lnRef idx="2">
+            <a:schemeClr val="accent1"/>
+          </a:lnRef>
+          <a:fillRef idx="0">
+            <a:schemeClr val="accent1"/>
+          </a:fillRef>
+          <a:effectRef idx="1">
+            <a:schemeClr val="accent1"/>
+          </a:effectRef>
+          <a:fontRef idx="minor">
+            <a:schemeClr val="tx1"/>
+          </a:fontRef>
+        </p:style>
+      </p:cxnSp>
+      <p:cxnSp>
+        <p:nvCxnSpPr>
+          <p:cNvPr id="40" name="Straight Connector 39">
+            <a:extLst>
+              <a:ext uri="{FF2B5EF4-FFF2-40B4-BE49-F238E27FC236}">
+                <a16:creationId xmlns:a16="http://schemas.microsoft.com/office/drawing/2014/main" id="{AAB1CAF0-2484-C4FD-35FF-1D38C51A7AEF}"/>
+              </a:ext>
+            </a:extLst>
+          </p:cNvPr>
+          <p:cNvCxnSpPr>
+            <a:cxnSpLocks/>
+          </p:cNvCxnSpPr>
+          <p:nvPr/>
+        </p:nvCxnSpPr>
+        <p:spPr>
+          <a:xfrm flipH="1" flipV="1">
+            <a:off x="4648200" y="2613441"/>
+            <a:ext cx="400050" cy="397784"/>
+          </a:xfrm>
+          <a:prstGeom prst="line">
+            <a:avLst/>
+          </a:prstGeom>
+          <a:ln w="38100">
+            <a:solidFill>
+              <a:schemeClr val="bg2">
+                <a:lumMod val="50000"/>
+              </a:schemeClr>
+            </a:solidFill>
+          </a:ln>
+        </p:spPr>
+        <p:style>
+          <a:lnRef idx="2">
+            <a:schemeClr val="accent1"/>
+          </a:lnRef>
+          <a:fillRef idx="0">
+            <a:schemeClr val="accent1"/>
+          </a:fillRef>
+          <a:effectRef idx="1">
+            <a:schemeClr val="accent1"/>
+          </a:effectRef>
+          <a:fontRef idx="minor">
+            <a:schemeClr val="tx1"/>
+          </a:fontRef>
+        </p:style>
+      </p:cxnSp>
+      <p:cxnSp>
+        <p:nvCxnSpPr>
+          <p:cNvPr id="41" name="Straight Connector 40">
+            <a:extLst>
+              <a:ext uri="{FF2B5EF4-FFF2-40B4-BE49-F238E27FC236}">
+                <a16:creationId xmlns:a16="http://schemas.microsoft.com/office/drawing/2014/main" id="{63F24129-7D5C-23BE-6290-46E91178CC20}"/>
+              </a:ext>
+            </a:extLst>
+          </p:cNvPr>
+          <p:cNvCxnSpPr>
+            <a:cxnSpLocks/>
+          </p:cNvCxnSpPr>
+          <p:nvPr/>
+        </p:nvCxnSpPr>
+        <p:spPr>
+          <a:xfrm flipH="1" flipV="1">
+            <a:off x="4961835" y="2283462"/>
+            <a:ext cx="325175" cy="575363"/>
+          </a:xfrm>
+          <a:prstGeom prst="line">
+            <a:avLst/>
+          </a:prstGeom>
+          <a:ln w="38100">
+            <a:solidFill>
+              <a:schemeClr val="bg2">
+                <a:lumMod val="50000"/>
+              </a:schemeClr>
+            </a:solidFill>
+          </a:ln>
+        </p:spPr>
+        <p:style>
+          <a:lnRef idx="2">
+            <a:schemeClr val="accent1"/>
+          </a:lnRef>
+          <a:fillRef idx="0">
+            <a:schemeClr val="accent1"/>
+          </a:fillRef>
+          <a:effectRef idx="1">
+            <a:schemeClr val="accent1"/>
+          </a:effectRef>
+          <a:fontRef idx="minor">
+            <a:schemeClr val="tx1"/>
+          </a:fontRef>
+        </p:style>
+      </p:cxnSp>
+      <p:cxnSp>
+        <p:nvCxnSpPr>
+          <p:cNvPr id="42" name="Straight Connector 41">
+            <a:extLst>
+              <a:ext uri="{FF2B5EF4-FFF2-40B4-BE49-F238E27FC236}">
+                <a16:creationId xmlns:a16="http://schemas.microsoft.com/office/drawing/2014/main" id="{87F2D7D1-E884-474F-0A72-D67E8A0D4241}"/>
+              </a:ext>
+            </a:extLst>
+          </p:cNvPr>
+          <p:cNvCxnSpPr>
+            <a:cxnSpLocks/>
+          </p:cNvCxnSpPr>
+          <p:nvPr/>
+        </p:nvCxnSpPr>
+        <p:spPr>
+          <a:xfrm flipV="1">
+            <a:off x="5612627" y="2187989"/>
+            <a:ext cx="12203" cy="590772"/>
+          </a:xfrm>
+          <a:prstGeom prst="line">
+            <a:avLst/>
+          </a:prstGeom>
+          <a:ln w="38100">
+            <a:solidFill>
+              <a:schemeClr val="bg2">
+                <a:lumMod val="50000"/>
+              </a:schemeClr>
+            </a:solidFill>
+          </a:ln>
+        </p:spPr>
+        <p:style>
+          <a:lnRef idx="2">
+            <a:schemeClr val="accent1"/>
+          </a:lnRef>
+          <a:fillRef idx="0">
+            <a:schemeClr val="accent1"/>
+          </a:fillRef>
+          <a:effectRef idx="1">
+            <a:schemeClr val="accent1"/>
+          </a:effectRef>
+          <a:fontRef idx="minor">
+            <a:schemeClr val="tx1"/>
+          </a:fontRef>
+        </p:style>
+      </p:cxnSp>
+      <p:cxnSp>
+        <p:nvCxnSpPr>
+          <p:cNvPr id="43" name="Straight Connector 42">
+            <a:extLst>
+              <a:ext uri="{FF2B5EF4-FFF2-40B4-BE49-F238E27FC236}">
+                <a16:creationId xmlns:a16="http://schemas.microsoft.com/office/drawing/2014/main" id="{CCA75C35-3B3E-FDE8-BF0C-C83A7B331F46}"/>
+              </a:ext>
+            </a:extLst>
+          </p:cNvPr>
+          <p:cNvCxnSpPr>
+            <a:cxnSpLocks/>
+          </p:cNvCxnSpPr>
+          <p:nvPr/>
+        </p:nvCxnSpPr>
+        <p:spPr>
+          <a:xfrm flipV="1">
+            <a:off x="5962650" y="2432878"/>
+            <a:ext cx="364683" cy="481827"/>
+          </a:xfrm>
+          <a:prstGeom prst="line">
+            <a:avLst/>
+          </a:prstGeom>
+          <a:ln w="38100">
+            <a:solidFill>
+              <a:schemeClr val="bg2">
+                <a:lumMod val="50000"/>
+              </a:schemeClr>
+            </a:solidFill>
+          </a:ln>
+        </p:spPr>
+        <p:style>
+          <a:lnRef idx="2">
+            <a:schemeClr val="accent1"/>
+          </a:lnRef>
+          <a:fillRef idx="0">
+            <a:schemeClr val="accent1"/>
+          </a:fillRef>
+          <a:effectRef idx="1">
+            <a:schemeClr val="accent1"/>
+          </a:effectRef>
+          <a:fontRef idx="minor">
+            <a:schemeClr val="tx1"/>
+          </a:fontRef>
+        </p:style>
+      </p:cxnSp>
+      <p:sp>
+        <p:nvSpPr>
+          <p:cNvPr id="2" name="TextBox 1">
+            <a:extLst>
+              <a:ext uri="{FF2B5EF4-FFF2-40B4-BE49-F238E27FC236}">
+                <a16:creationId xmlns:a16="http://schemas.microsoft.com/office/drawing/2014/main" id="{B9D8916F-67E1-1338-2B27-50681FB0F132}"/>
+              </a:ext>
+            </a:extLst>
+          </p:cNvPr>
+          <p:cNvSpPr txBox="1"/>
+          <p:nvPr/>
+        </p:nvSpPr>
+        <p:spPr>
+          <a:xfrm>
+            <a:off x="5086570" y="723737"/>
+            <a:ext cx="1173480" cy="261610"/>
+          </a:xfrm>
+          <a:prstGeom prst="rect">
+            <a:avLst/>
+          </a:prstGeom>
+          <a:noFill/>
+        </p:spPr>
+        <p:txBody>
+          <a:bodyPr wrap="square" rtlCol="0">
+            <a:spAutoFit/>
+          </a:bodyPr>
+          <a:lstStyle/>
+          <a:p>
+            <a:pPr algn="ctr"/>
+            <a:r>
+              <a:rPr lang="en-US" sz="1100" dirty="0"/>
+              <a:t>Equinox</a:t>
+            </a:r>
+          </a:p>
+        </p:txBody>
+      </p:sp>
+      <p:sp>
+        <p:nvSpPr>
+          <p:cNvPr id="3" name="TextBox 2">
+            <a:extLst>
+              <a:ext uri="{FF2B5EF4-FFF2-40B4-BE49-F238E27FC236}">
+                <a16:creationId xmlns:a16="http://schemas.microsoft.com/office/drawing/2014/main" id="{EBA2659D-582B-0C46-705E-78AC3EF1028E}"/>
+              </a:ext>
+            </a:extLst>
+          </p:cNvPr>
+          <p:cNvSpPr txBox="1"/>
+          <p:nvPr/>
+        </p:nvSpPr>
+        <p:spPr>
+          <a:xfrm>
+            <a:off x="4969730" y="6237357"/>
+            <a:ext cx="1329470" cy="261610"/>
+          </a:xfrm>
+          <a:prstGeom prst="rect">
+            <a:avLst/>
+          </a:prstGeom>
+          <a:noFill/>
+        </p:spPr>
+        <p:txBody>
+          <a:bodyPr wrap="square" rtlCol="0">
+            <a:spAutoFit/>
+          </a:bodyPr>
+          <a:lstStyle/>
+          <a:p>
+            <a:pPr algn="ctr"/>
+            <a:r>
+              <a:rPr lang="en-US" sz="1100" dirty="0"/>
+              <a:t>Equinox</a:t>
+            </a:r>
+          </a:p>
+        </p:txBody>
+      </p:sp>
+      <p:sp>
+        <p:nvSpPr>
+          <p:cNvPr id="4" name="TextBox 3">
+            <a:extLst>
+              <a:ext uri="{FF2B5EF4-FFF2-40B4-BE49-F238E27FC236}">
+                <a16:creationId xmlns:a16="http://schemas.microsoft.com/office/drawing/2014/main" id="{C687D823-46D0-DAA5-82E1-BEBAE00E36CD}"/>
+              </a:ext>
+            </a:extLst>
+          </p:cNvPr>
+          <p:cNvSpPr txBox="1"/>
+          <p:nvPr/>
+        </p:nvSpPr>
+        <p:spPr>
+          <a:xfrm rot="5400000">
+            <a:off x="7808704" y="3387145"/>
+            <a:ext cx="1329470" cy="261610"/>
+          </a:xfrm>
+          <a:prstGeom prst="rect">
+            <a:avLst/>
+          </a:prstGeom>
+          <a:noFill/>
+        </p:spPr>
+        <p:txBody>
+          <a:bodyPr wrap="square" rtlCol="0">
+            <a:spAutoFit/>
+          </a:bodyPr>
+          <a:lstStyle/>
+          <a:p>
+            <a:pPr algn="ctr"/>
+            <a:r>
+              <a:rPr lang="en-US" sz="1100" dirty="0"/>
+              <a:t>Solstice</a:t>
+            </a:r>
+          </a:p>
+        </p:txBody>
+      </p:sp>
+      <p:sp>
+        <p:nvSpPr>
+          <p:cNvPr id="7" name="TextBox 6">
+            <a:extLst>
+              <a:ext uri="{FF2B5EF4-FFF2-40B4-BE49-F238E27FC236}">
+                <a16:creationId xmlns:a16="http://schemas.microsoft.com/office/drawing/2014/main" id="{2FB0E3DD-A747-FE5B-82E3-5FC4467334E5}"/>
+              </a:ext>
+            </a:extLst>
+          </p:cNvPr>
+          <p:cNvSpPr txBox="1"/>
+          <p:nvPr/>
+        </p:nvSpPr>
+        <p:spPr>
+          <a:xfrm rot="16200000">
+            <a:off x="2217032" y="3331073"/>
+            <a:ext cx="1329470" cy="261610"/>
+          </a:xfrm>
+          <a:prstGeom prst="rect">
+            <a:avLst/>
+          </a:prstGeom>
+          <a:noFill/>
+        </p:spPr>
+        <p:txBody>
+          <a:bodyPr wrap="square" rtlCol="0">
+            <a:spAutoFit/>
+          </a:bodyPr>
+          <a:lstStyle/>
+          <a:p>
+            <a:pPr algn="ctr"/>
+            <a:r>
+              <a:rPr lang="en-US" sz="1100" dirty="0"/>
+              <a:t>Solstice</a:t>
+            </a:r>
+          </a:p>
+        </p:txBody>
+      </p:sp>
+      <p:sp>
+        <p:nvSpPr>
+          <p:cNvPr id="9" name="TextBox 8">
+            <a:extLst>
+              <a:ext uri="{FF2B5EF4-FFF2-40B4-BE49-F238E27FC236}">
+                <a16:creationId xmlns:a16="http://schemas.microsoft.com/office/drawing/2014/main" id="{055742F0-B8CA-47EA-276B-293A02F8F908}"/>
+              </a:ext>
+            </a:extLst>
+          </p:cNvPr>
+          <p:cNvSpPr txBox="1"/>
+          <p:nvPr/>
+        </p:nvSpPr>
+        <p:spPr>
+          <a:xfrm rot="2700000">
+            <a:off x="2357865" y="6071280"/>
+            <a:ext cx="1329470" cy="261610"/>
+          </a:xfrm>
+          <a:prstGeom prst="rect">
+            <a:avLst/>
+          </a:prstGeom>
+          <a:noFill/>
+        </p:spPr>
+        <p:txBody>
+          <a:bodyPr wrap="square" rtlCol="0">
+            <a:spAutoFit/>
+          </a:bodyPr>
+          <a:lstStyle/>
+          <a:p>
+            <a:pPr algn="ctr"/>
+            <a:r>
+              <a:rPr lang="en-US" sz="1100" dirty="0"/>
+              <a:t>Halloween</a:t>
+            </a:r>
+          </a:p>
+        </p:txBody>
+      </p:sp>
+      <p:sp>
+        <p:nvSpPr>
+          <p:cNvPr id="12" name="TextBox 11">
+            <a:extLst>
+              <a:ext uri="{FF2B5EF4-FFF2-40B4-BE49-F238E27FC236}">
+                <a16:creationId xmlns:a16="http://schemas.microsoft.com/office/drawing/2014/main" id="{CB603D21-7CE5-1AF4-56DB-36675421B384}"/>
+              </a:ext>
+            </a:extLst>
+          </p:cNvPr>
+          <p:cNvSpPr txBox="1"/>
+          <p:nvPr/>
+        </p:nvSpPr>
+        <p:spPr>
+          <a:xfrm rot="18900000">
+            <a:off x="2406690" y="786018"/>
+            <a:ext cx="1329470" cy="261610"/>
+          </a:xfrm>
+          <a:prstGeom prst="rect">
+            <a:avLst/>
+          </a:prstGeom>
+          <a:noFill/>
+        </p:spPr>
+        <p:txBody>
+          <a:bodyPr wrap="square" rtlCol="0">
+            <a:spAutoFit/>
+          </a:bodyPr>
+          <a:lstStyle/>
+          <a:p>
+            <a:pPr algn="ctr"/>
+            <a:r>
+              <a:rPr lang="en-US" sz="1100" dirty="0"/>
+              <a:t>Groundhog Day</a:t>
+            </a:r>
+          </a:p>
+        </p:txBody>
+      </p:sp>
+      <p:sp>
+        <p:nvSpPr>
+          <p:cNvPr id="14" name="TextBox 13">
+            <a:extLst>
+              <a:ext uri="{FF2B5EF4-FFF2-40B4-BE49-F238E27FC236}">
+                <a16:creationId xmlns:a16="http://schemas.microsoft.com/office/drawing/2014/main" id="{CCC2DDAB-555F-922C-C37C-83D540542F84}"/>
+              </a:ext>
+            </a:extLst>
+          </p:cNvPr>
+          <p:cNvSpPr txBox="1"/>
+          <p:nvPr/>
+        </p:nvSpPr>
+        <p:spPr>
+          <a:xfrm rot="2700000">
+            <a:off x="7706437" y="786017"/>
+            <a:ext cx="1329470" cy="261610"/>
+          </a:xfrm>
+          <a:prstGeom prst="rect">
+            <a:avLst/>
+          </a:prstGeom>
+          <a:noFill/>
+        </p:spPr>
+        <p:txBody>
+          <a:bodyPr wrap="square" rtlCol="0">
+            <a:spAutoFit/>
+          </a:bodyPr>
+          <a:lstStyle/>
+          <a:p>
+            <a:pPr algn="ctr"/>
+            <a:r>
+              <a:rPr lang="en-US" sz="1100" dirty="0"/>
+              <a:t>Beltane</a:t>
+            </a:r>
+          </a:p>
+        </p:txBody>
+      </p:sp>
+      <p:sp>
+        <p:nvSpPr>
+          <p:cNvPr id="46" name="Diamond 45">
+            <a:extLst>
+              <a:ext uri="{FF2B5EF4-FFF2-40B4-BE49-F238E27FC236}">
+                <a16:creationId xmlns:a16="http://schemas.microsoft.com/office/drawing/2014/main" id="{3C28C9F5-60C3-05BD-EEDE-24B62A356733}"/>
+              </a:ext>
+            </a:extLst>
+          </p:cNvPr>
+          <p:cNvSpPr/>
+          <p:nvPr/>
+        </p:nvSpPr>
+        <p:spPr>
+          <a:xfrm>
+            <a:off x="8070855" y="977944"/>
+            <a:ext cx="198115" cy="198115"/>
+          </a:xfrm>
+          <a:prstGeom prst="diamond">
+            <a:avLst/>
+          </a:prstGeom>
+        </p:spPr>
+        <p:style>
+          <a:lnRef idx="2">
+            <a:schemeClr val="accent1">
+              <a:shade val="15000"/>
+            </a:schemeClr>
+          </a:lnRef>
+          <a:fillRef idx="1">
+            <a:schemeClr val="accent1"/>
+          </a:fillRef>
+          <a:effectRef idx="0">
+            <a:schemeClr val="accent1"/>
+          </a:effectRef>
+          <a:fontRef idx="minor">
+            <a:schemeClr val="lt1"/>
+          </a:fontRef>
+        </p:style>
+        <p:txBody>
+          <a:bodyPr rtlCol="0" anchor="ctr"/>
+          <a:lstStyle/>
+          <a:p>
+            <a:pPr algn="ctr"/>
+            <a:endParaRPr lang="en-US"/>
+          </a:p>
+        </p:txBody>
+      </p:sp>
+      <p:sp>
+        <p:nvSpPr>
+          <p:cNvPr id="47" name="Diamond 46">
+            <a:extLst>
+              <a:ext uri="{FF2B5EF4-FFF2-40B4-BE49-F238E27FC236}">
+                <a16:creationId xmlns:a16="http://schemas.microsoft.com/office/drawing/2014/main" id="{A3BCFB9D-27C5-1103-B18F-665E3ED76FEF}"/>
+              </a:ext>
+            </a:extLst>
+          </p:cNvPr>
+          <p:cNvSpPr/>
+          <p:nvPr/>
+        </p:nvSpPr>
+        <p:spPr>
+          <a:xfrm>
+            <a:off x="8070855" y="3415507"/>
+            <a:ext cx="198115" cy="198115"/>
+          </a:xfrm>
+          <a:prstGeom prst="diamond">
+            <a:avLst/>
+          </a:prstGeom>
+        </p:spPr>
+        <p:style>
+          <a:lnRef idx="2">
+            <a:schemeClr val="accent1">
+              <a:shade val="15000"/>
+            </a:schemeClr>
+          </a:lnRef>
+          <a:fillRef idx="1">
+            <a:schemeClr val="accent1"/>
+          </a:fillRef>
+          <a:effectRef idx="0">
+            <a:schemeClr val="accent1"/>
+          </a:effectRef>
+          <a:fontRef idx="minor">
+            <a:schemeClr val="lt1"/>
+          </a:fontRef>
+        </p:style>
+        <p:txBody>
+          <a:bodyPr rtlCol="0" anchor="ctr"/>
+          <a:lstStyle/>
+          <a:p>
+            <a:pPr algn="ctr"/>
+            <a:endParaRPr lang="en-US"/>
+          </a:p>
+        </p:txBody>
+      </p:sp>
+      <p:sp>
+        <p:nvSpPr>
+          <p:cNvPr id="48" name="Diamond 47">
+            <a:extLst>
+              <a:ext uri="{FF2B5EF4-FFF2-40B4-BE49-F238E27FC236}">
+                <a16:creationId xmlns:a16="http://schemas.microsoft.com/office/drawing/2014/main" id="{2EF00DAD-EBCA-7D77-2B64-7F895966CEFC}"/>
+              </a:ext>
+            </a:extLst>
+          </p:cNvPr>
+          <p:cNvSpPr/>
+          <p:nvPr/>
+        </p:nvSpPr>
+        <p:spPr>
+          <a:xfrm>
+            <a:off x="8070855" y="5955574"/>
+            <a:ext cx="198115" cy="198115"/>
+          </a:xfrm>
+          <a:prstGeom prst="diamond">
+            <a:avLst/>
+          </a:prstGeom>
+        </p:spPr>
+        <p:style>
+          <a:lnRef idx="2">
+            <a:schemeClr val="accent1">
+              <a:shade val="15000"/>
+            </a:schemeClr>
+          </a:lnRef>
+          <a:fillRef idx="1">
+            <a:schemeClr val="accent1"/>
+          </a:fillRef>
+          <a:effectRef idx="0">
+            <a:schemeClr val="accent1"/>
+          </a:effectRef>
+          <a:fontRef idx="minor">
+            <a:schemeClr val="lt1"/>
+          </a:fontRef>
+        </p:style>
+        <p:txBody>
+          <a:bodyPr rtlCol="0" anchor="ctr"/>
+          <a:lstStyle/>
+          <a:p>
+            <a:pPr algn="ctr"/>
+            <a:endParaRPr lang="en-US"/>
+          </a:p>
+        </p:txBody>
+      </p:sp>
+      <p:sp>
+        <p:nvSpPr>
+          <p:cNvPr id="49" name="Diamond 48">
+            <a:extLst>
+              <a:ext uri="{FF2B5EF4-FFF2-40B4-BE49-F238E27FC236}">
+                <a16:creationId xmlns:a16="http://schemas.microsoft.com/office/drawing/2014/main" id="{0D8A9578-27A4-7F2E-B711-ACD37AEDD950}"/>
+              </a:ext>
+            </a:extLst>
+          </p:cNvPr>
+          <p:cNvSpPr/>
+          <p:nvPr/>
+        </p:nvSpPr>
+        <p:spPr>
+          <a:xfrm>
+            <a:off x="5548507" y="5955574"/>
+            <a:ext cx="198115" cy="198115"/>
+          </a:xfrm>
+          <a:prstGeom prst="diamond">
+            <a:avLst/>
+          </a:prstGeom>
+        </p:spPr>
+        <p:style>
+          <a:lnRef idx="2">
+            <a:schemeClr val="accent1">
+              <a:shade val="15000"/>
+            </a:schemeClr>
+          </a:lnRef>
+          <a:fillRef idx="1">
+            <a:schemeClr val="accent1"/>
+          </a:fillRef>
+          <a:effectRef idx="0">
+            <a:schemeClr val="accent1"/>
+          </a:effectRef>
+          <a:fontRef idx="minor">
+            <a:schemeClr val="lt1"/>
+          </a:fontRef>
+        </p:style>
+        <p:txBody>
+          <a:bodyPr rtlCol="0" anchor="ctr"/>
+          <a:lstStyle/>
+          <a:p>
+            <a:pPr algn="ctr"/>
+            <a:endParaRPr lang="en-US"/>
+          </a:p>
+        </p:txBody>
+      </p:sp>
+      <p:sp>
+        <p:nvSpPr>
+          <p:cNvPr id="50" name="Diamond 49">
+            <a:extLst>
+              <a:ext uri="{FF2B5EF4-FFF2-40B4-BE49-F238E27FC236}">
+                <a16:creationId xmlns:a16="http://schemas.microsoft.com/office/drawing/2014/main" id="{DC19ECBB-DB7E-860B-314C-87BD56892AE2}"/>
+              </a:ext>
+            </a:extLst>
+          </p:cNvPr>
+          <p:cNvSpPr/>
+          <p:nvPr/>
+        </p:nvSpPr>
+        <p:spPr>
+          <a:xfrm>
+            <a:off x="3071425" y="5955574"/>
+            <a:ext cx="198115" cy="198115"/>
+          </a:xfrm>
+          <a:prstGeom prst="diamond">
+            <a:avLst/>
+          </a:prstGeom>
+        </p:spPr>
+        <p:style>
+          <a:lnRef idx="2">
+            <a:schemeClr val="accent1">
+              <a:shade val="15000"/>
+            </a:schemeClr>
+          </a:lnRef>
+          <a:fillRef idx="1">
+            <a:schemeClr val="accent1"/>
+          </a:fillRef>
+          <a:effectRef idx="0">
+            <a:schemeClr val="accent1"/>
+          </a:effectRef>
+          <a:fontRef idx="minor">
+            <a:schemeClr val="lt1"/>
+          </a:fontRef>
+        </p:style>
+        <p:txBody>
+          <a:bodyPr rtlCol="0" anchor="ctr"/>
+          <a:lstStyle/>
+          <a:p>
+            <a:pPr algn="ctr"/>
+            <a:endParaRPr lang="en-US"/>
+          </a:p>
+        </p:txBody>
+      </p:sp>
+      <p:sp>
+        <p:nvSpPr>
+          <p:cNvPr id="51" name="Diamond 50">
+            <a:extLst>
+              <a:ext uri="{FF2B5EF4-FFF2-40B4-BE49-F238E27FC236}">
+                <a16:creationId xmlns:a16="http://schemas.microsoft.com/office/drawing/2014/main" id="{89781B1C-8534-BB38-ED40-A0330510E9AD}"/>
+              </a:ext>
+            </a:extLst>
+          </p:cNvPr>
+          <p:cNvSpPr/>
+          <p:nvPr/>
+        </p:nvSpPr>
+        <p:spPr>
+          <a:xfrm>
+            <a:off x="3071425" y="3368042"/>
+            <a:ext cx="198115" cy="198115"/>
+          </a:xfrm>
+          <a:prstGeom prst="diamond">
+            <a:avLst/>
+          </a:prstGeom>
+        </p:spPr>
+        <p:style>
+          <a:lnRef idx="2">
+            <a:schemeClr val="accent1">
+              <a:shade val="15000"/>
+            </a:schemeClr>
+          </a:lnRef>
+          <a:fillRef idx="1">
+            <a:schemeClr val="accent1"/>
+          </a:fillRef>
+          <a:effectRef idx="0">
+            <a:schemeClr val="accent1"/>
+          </a:effectRef>
+          <a:fontRef idx="minor">
+            <a:schemeClr val="lt1"/>
+          </a:fontRef>
+        </p:style>
+        <p:txBody>
+          <a:bodyPr rtlCol="0" anchor="ctr"/>
+          <a:lstStyle/>
+          <a:p>
+            <a:pPr algn="ctr"/>
+            <a:endParaRPr lang="en-US"/>
+          </a:p>
+        </p:txBody>
+      </p:sp>
+      <p:sp>
+        <p:nvSpPr>
+          <p:cNvPr id="52" name="Diamond 51">
+            <a:extLst>
+              <a:ext uri="{FF2B5EF4-FFF2-40B4-BE49-F238E27FC236}">
+                <a16:creationId xmlns:a16="http://schemas.microsoft.com/office/drawing/2014/main" id="{DE12E4B4-7409-BC59-B100-6E4E2434FDA4}"/>
+              </a:ext>
+            </a:extLst>
+          </p:cNvPr>
+          <p:cNvSpPr/>
+          <p:nvPr/>
+        </p:nvSpPr>
+        <p:spPr>
+          <a:xfrm>
+            <a:off x="3071425" y="985563"/>
+            <a:ext cx="198115" cy="198115"/>
+          </a:xfrm>
+          <a:prstGeom prst="diamond">
+            <a:avLst/>
+          </a:prstGeom>
+        </p:spPr>
+        <p:style>
+          <a:lnRef idx="2">
+            <a:schemeClr val="accent1">
+              <a:shade val="15000"/>
+            </a:schemeClr>
+          </a:lnRef>
+          <a:fillRef idx="1">
+            <a:schemeClr val="accent1"/>
+          </a:fillRef>
+          <a:effectRef idx="0">
+            <a:schemeClr val="accent1"/>
+          </a:effectRef>
+          <a:fontRef idx="minor">
+            <a:schemeClr val="lt1"/>
+          </a:fontRef>
+        </p:style>
+        <p:txBody>
+          <a:bodyPr rtlCol="0" anchor="ctr"/>
+          <a:lstStyle/>
+          <a:p>
+            <a:pPr algn="ctr"/>
+            <a:endParaRPr lang="en-US"/>
+          </a:p>
+        </p:txBody>
+      </p:sp>
+      <p:sp>
+        <p:nvSpPr>
+          <p:cNvPr id="53" name="Diamond 52">
+            <a:extLst>
+              <a:ext uri="{FF2B5EF4-FFF2-40B4-BE49-F238E27FC236}">
+                <a16:creationId xmlns:a16="http://schemas.microsoft.com/office/drawing/2014/main" id="{502F9008-2EAE-8FCF-E2BA-63D734548C93}"/>
+              </a:ext>
+            </a:extLst>
+          </p:cNvPr>
+          <p:cNvSpPr/>
+          <p:nvPr/>
+        </p:nvSpPr>
+        <p:spPr>
+          <a:xfrm>
+            <a:off x="5574174" y="975403"/>
+            <a:ext cx="198115" cy="198115"/>
+          </a:xfrm>
+          <a:prstGeom prst="diamond">
+            <a:avLst/>
+          </a:prstGeom>
+        </p:spPr>
+        <p:style>
+          <a:lnRef idx="2">
+            <a:schemeClr val="accent1">
+              <a:shade val="15000"/>
+            </a:schemeClr>
+          </a:lnRef>
+          <a:fillRef idx="1">
+            <a:schemeClr val="accent1"/>
+          </a:fillRef>
+          <a:effectRef idx="0">
+            <a:schemeClr val="accent1"/>
+          </a:effectRef>
+          <a:fontRef idx="minor">
+            <a:schemeClr val="lt1"/>
+          </a:fontRef>
+        </p:style>
+        <p:txBody>
+          <a:bodyPr rtlCol="0" anchor="ctr"/>
+          <a:lstStyle/>
+          <a:p>
+            <a:pPr algn="ctr"/>
+            <a:endParaRPr lang="en-US"/>
+          </a:p>
+        </p:txBody>
+      </p:sp>
+      <p:sp>
+        <p:nvSpPr>
+          <p:cNvPr id="5" name="Oval 4">
+            <a:extLst>
+              <a:ext uri="{FF2B5EF4-FFF2-40B4-BE49-F238E27FC236}">
+                <a16:creationId xmlns:a16="http://schemas.microsoft.com/office/drawing/2014/main" id="{794BE207-E346-35C2-01F0-17A2BF3425AB}"/>
+              </a:ext>
+            </a:extLst>
+          </p:cNvPr>
+          <p:cNvSpPr/>
+          <p:nvPr/>
+        </p:nvSpPr>
+        <p:spPr>
+          <a:xfrm>
+            <a:off x="3179748" y="1072127"/>
+            <a:ext cx="4987124" cy="4987124"/>
+          </a:xfrm>
+          <a:prstGeom prst="ellipse">
+            <a:avLst/>
+          </a:prstGeom>
+          <a:noFill/>
+        </p:spPr>
+        <p:style>
+          <a:lnRef idx="2">
+            <a:schemeClr val="accent1">
+              <a:shade val="15000"/>
+            </a:schemeClr>
+          </a:lnRef>
+          <a:fillRef idx="1">
+            <a:schemeClr val="accent1"/>
+          </a:fillRef>
+          <a:effectRef idx="0">
+            <a:schemeClr val="accent1"/>
+          </a:effectRef>
+          <a:fontRef idx="minor">
+            <a:schemeClr val="lt1"/>
+          </a:fontRef>
+        </p:style>
+        <p:txBody>
+          <a:bodyPr rtlCol="0" anchor="ctr"/>
+          <a:lstStyle/>
+          <a:p>
+            <a:pPr algn="ctr"/>
+            <a:endParaRPr lang="en-US"/>
+          </a:p>
+        </p:txBody>
+      </p:sp>
+      <p:sp>
+        <p:nvSpPr>
+          <p:cNvPr id="54" name="TextBox 53">
+            <a:extLst>
+              <a:ext uri="{FF2B5EF4-FFF2-40B4-BE49-F238E27FC236}">
+                <a16:creationId xmlns:a16="http://schemas.microsoft.com/office/drawing/2014/main" id="{6D9981EF-A2B6-8168-2288-1293D0EAFB4C}"/>
+              </a:ext>
+            </a:extLst>
+          </p:cNvPr>
+          <p:cNvSpPr txBox="1"/>
+          <p:nvPr/>
+        </p:nvSpPr>
+        <p:spPr>
+          <a:xfrm rot="18900000">
+            <a:off x="7659285" y="6071279"/>
+            <a:ext cx="1329470" cy="261610"/>
+          </a:xfrm>
+          <a:prstGeom prst="rect">
+            <a:avLst/>
+          </a:prstGeom>
+          <a:noFill/>
+        </p:spPr>
+        <p:txBody>
+          <a:bodyPr wrap="square" rtlCol="0">
+            <a:spAutoFit/>
+          </a:bodyPr>
+          <a:lstStyle/>
+          <a:p>
+            <a:pPr algn="ctr"/>
+            <a:r>
+              <a:rPr lang="en-US" sz="1100" dirty="0"/>
+              <a:t>Lammas</a:t>
+            </a:r>
+          </a:p>
+        </p:txBody>
+      </p:sp>
+      <p:sp>
+        <p:nvSpPr>
+          <p:cNvPr id="58" name="TextBox 57">
+            <a:extLst>
+              <a:ext uri="{FF2B5EF4-FFF2-40B4-BE49-F238E27FC236}">
+                <a16:creationId xmlns:a16="http://schemas.microsoft.com/office/drawing/2014/main" id="{26A3D9BB-1A9F-F4F7-D7C4-5EE140FD913A}"/>
+              </a:ext>
+            </a:extLst>
+          </p:cNvPr>
+          <p:cNvSpPr txBox="1"/>
+          <p:nvPr/>
+        </p:nvSpPr>
+        <p:spPr>
+          <a:xfrm rot="18900000">
+            <a:off x="7005536" y="5406333"/>
+            <a:ext cx="1329470" cy="261610"/>
+          </a:xfrm>
+          <a:prstGeom prst="rect">
+            <a:avLst/>
+          </a:prstGeom>
+          <a:noFill/>
+        </p:spPr>
+        <p:txBody>
+          <a:bodyPr wrap="square" rtlCol="0">
+            <a:spAutoFit/>
+          </a:bodyPr>
+          <a:lstStyle/>
+          <a:p>
+            <a:pPr algn="ctr"/>
+            <a:r>
+              <a:rPr lang="en-US" sz="1100" dirty="0"/>
+              <a:t>SUMMER</a:t>
+            </a:r>
+          </a:p>
+        </p:txBody>
+      </p:sp>
+      <p:sp>
+        <p:nvSpPr>
+          <p:cNvPr id="59" name="TextBox 58">
+            <a:extLst>
+              <a:ext uri="{FF2B5EF4-FFF2-40B4-BE49-F238E27FC236}">
+                <a16:creationId xmlns:a16="http://schemas.microsoft.com/office/drawing/2014/main" id="{56D8F481-0556-F77F-CFC2-29E579BCE293}"/>
+              </a:ext>
+            </a:extLst>
+          </p:cNvPr>
+          <p:cNvSpPr txBox="1"/>
+          <p:nvPr/>
+        </p:nvSpPr>
+        <p:spPr>
+          <a:xfrm rot="2700000">
+            <a:off x="6983601" y="1404634"/>
+            <a:ext cx="1329470" cy="261610"/>
+          </a:xfrm>
+          <a:prstGeom prst="rect">
+            <a:avLst/>
+          </a:prstGeom>
+          <a:noFill/>
+        </p:spPr>
+        <p:txBody>
+          <a:bodyPr wrap="square" rtlCol="0">
+            <a:spAutoFit/>
+          </a:bodyPr>
+          <a:lstStyle/>
+          <a:p>
+            <a:pPr algn="ctr"/>
+            <a:r>
+              <a:rPr lang="en-US" sz="1100" dirty="0"/>
+              <a:t>SPRING</a:t>
+            </a:r>
+          </a:p>
+        </p:txBody>
+      </p:sp>
+      <p:sp>
+        <p:nvSpPr>
+          <p:cNvPr id="60" name="TextBox 59">
+            <a:extLst>
+              <a:ext uri="{FF2B5EF4-FFF2-40B4-BE49-F238E27FC236}">
+                <a16:creationId xmlns:a16="http://schemas.microsoft.com/office/drawing/2014/main" id="{14EE2104-50B4-F0A6-401D-90E894F7AF6D}"/>
+              </a:ext>
+            </a:extLst>
+          </p:cNvPr>
+          <p:cNvSpPr txBox="1"/>
+          <p:nvPr/>
+        </p:nvSpPr>
+        <p:spPr>
+          <a:xfrm rot="18900000">
+            <a:off x="3038876" y="1506472"/>
+            <a:ext cx="1329470" cy="261610"/>
+          </a:xfrm>
+          <a:prstGeom prst="rect">
+            <a:avLst/>
+          </a:prstGeom>
+          <a:noFill/>
+        </p:spPr>
+        <p:txBody>
+          <a:bodyPr wrap="square" rtlCol="0">
+            <a:spAutoFit/>
+          </a:bodyPr>
+          <a:lstStyle/>
+          <a:p>
+            <a:pPr algn="ctr"/>
+            <a:r>
+              <a:rPr lang="en-US" sz="1100" dirty="0"/>
+              <a:t>WINTER</a:t>
+            </a:r>
+          </a:p>
+        </p:txBody>
+      </p:sp>
+      <p:sp>
+        <p:nvSpPr>
+          <p:cNvPr id="61" name="TextBox 60">
+            <a:extLst>
+              <a:ext uri="{FF2B5EF4-FFF2-40B4-BE49-F238E27FC236}">
+                <a16:creationId xmlns:a16="http://schemas.microsoft.com/office/drawing/2014/main" id="{E26FF0A0-45C0-DC14-E481-D97225D5BBD9}"/>
+              </a:ext>
+            </a:extLst>
+          </p:cNvPr>
+          <p:cNvSpPr txBox="1"/>
+          <p:nvPr/>
+        </p:nvSpPr>
+        <p:spPr>
+          <a:xfrm rot="2700000">
+            <a:off x="2990879" y="5466159"/>
+            <a:ext cx="1329470" cy="261610"/>
+          </a:xfrm>
+          <a:prstGeom prst="rect">
+            <a:avLst/>
+          </a:prstGeom>
+          <a:noFill/>
+        </p:spPr>
+        <p:txBody>
+          <a:bodyPr wrap="square" rtlCol="0">
+            <a:spAutoFit/>
+          </a:bodyPr>
+          <a:lstStyle/>
+          <a:p>
+            <a:pPr algn="ctr"/>
+            <a:r>
+              <a:rPr lang="en-US" sz="1100" dirty="0"/>
+              <a:t>AUTUMN</a:t>
+            </a:r>
+          </a:p>
+        </p:txBody>
+      </p:sp>
+    </p:spTree>
+    <p:extLst>
+      <p:ext uri="{BB962C8B-B14F-4D97-AF65-F5344CB8AC3E}">
+        <p14:creationId xmlns:p14="http://schemas.microsoft.com/office/powerpoint/2010/main" val="890624571"/>
+      </p:ext>
+    </p:extLst>
+  </p:cSld>
+  <p:clrMapOvr>
+    <a:masterClrMapping/>
+  </p:clrMapOvr>
+</p:sld>
+</file>
+
+<file path=ppt/slides/slide4.xml><?xml version="1.0" encoding="utf-8"?>
+<p:sld xmlns:a="http://schemas.openxmlformats.org/drawingml/2006/main" xmlns:r="http://schemas.openxmlformats.org/officeDocument/2006/relationships" xmlns:p="http://schemas.openxmlformats.org/presentationml/2006/main">
+  <p:cSld>
+    <p:bg>
+      <p:bgPr>
+        <a:noFill/>
+        <a:effectLst/>
+      </p:bgPr>
+    </p:bg>
+    <p:spTree>
+      <p:nvGrpSpPr>
+        <p:cNvPr id="1" name="">
+          <a:extLst>
+            <a:ext uri="{FF2B5EF4-FFF2-40B4-BE49-F238E27FC236}">
               <a16:creationId xmlns:a16="http://schemas.microsoft.com/office/drawing/2014/main" id="{C93879BB-225D-EC08-8CC2-A08890696FD6}"/>
             </a:ext>
           </a:extLst>

</xml_diff>